<commit_message>
am really satisfied with the HTML layout and CSS files for this website.  The html for the HearingToolsProject.html main page is looking almost identical to the powerpoint I created.
</commit_message>
<xml_diff>
--- a/Homework5/CodingVisual.pptx
+++ b/Homework5/CodingVisual.pptx
@@ -7,6 +7,13 @@
   <p:sldIdLst>
     <p:sldId id="281" r:id="rId2"/>
     <p:sldId id="280" r:id="rId3"/>
+    <p:sldId id="282" r:id="rId4"/>
+    <p:sldId id="283" r:id="rId5"/>
+    <p:sldId id="284" r:id="rId6"/>
+    <p:sldId id="285" r:id="rId7"/>
+    <p:sldId id="286" r:id="rId8"/>
+    <p:sldId id="287" r:id="rId9"/>
+    <p:sldId id="288" r:id="rId10"/>
   </p:sldIdLst>
   <p:sldSz cx="6858000" cy="9144000" type="screen4x3"/>
   <p:notesSz cx="6858000" cy="9144000"/>
@@ -289,7 +296,7 @@
           <a:p>
             <a:fld id="{630F5BE5-B688-FF42-89B2-94D9E9242ADB}" type="datetimeFigureOut">
               <a:rPr lang="en-US" smtClean="0"/>
-              <a:t>10/21/16</a:t>
+              <a:t>10/24/16</a:t>
             </a:fld>
             <a:endParaRPr lang="en-US"/>
           </a:p>
@@ -459,7 +466,7 @@
           <a:p>
             <a:fld id="{630F5BE5-B688-FF42-89B2-94D9E9242ADB}" type="datetimeFigureOut">
               <a:rPr lang="en-US" smtClean="0"/>
-              <a:t>10/21/16</a:t>
+              <a:t>10/24/16</a:t>
             </a:fld>
             <a:endParaRPr lang="en-US"/>
           </a:p>
@@ -639,7 +646,7 @@
           <a:p>
             <a:fld id="{630F5BE5-B688-FF42-89B2-94D9E9242ADB}" type="datetimeFigureOut">
               <a:rPr lang="en-US" smtClean="0"/>
-              <a:t>10/21/16</a:t>
+              <a:t>10/24/16</a:t>
             </a:fld>
             <a:endParaRPr lang="en-US"/>
           </a:p>
@@ -809,7 +816,7 @@
           <a:p>
             <a:fld id="{630F5BE5-B688-FF42-89B2-94D9E9242ADB}" type="datetimeFigureOut">
               <a:rPr lang="en-US" smtClean="0"/>
-              <a:t>10/21/16</a:t>
+              <a:t>10/24/16</a:t>
             </a:fld>
             <a:endParaRPr lang="en-US"/>
           </a:p>
@@ -1055,7 +1062,7 @@
           <a:p>
             <a:fld id="{630F5BE5-B688-FF42-89B2-94D9E9242ADB}" type="datetimeFigureOut">
               <a:rPr lang="en-US" smtClean="0"/>
-              <a:t>10/21/16</a:t>
+              <a:t>10/24/16</a:t>
             </a:fld>
             <a:endParaRPr lang="en-US"/>
           </a:p>
@@ -1343,7 +1350,7 @@
           <a:p>
             <a:fld id="{630F5BE5-B688-FF42-89B2-94D9E9242ADB}" type="datetimeFigureOut">
               <a:rPr lang="en-US" smtClean="0"/>
-              <a:t>10/21/16</a:t>
+              <a:t>10/24/16</a:t>
             </a:fld>
             <a:endParaRPr lang="en-US"/>
           </a:p>
@@ -1765,7 +1772,7 @@
           <a:p>
             <a:fld id="{630F5BE5-B688-FF42-89B2-94D9E9242ADB}" type="datetimeFigureOut">
               <a:rPr lang="en-US" smtClean="0"/>
-              <a:t>10/21/16</a:t>
+              <a:t>10/24/16</a:t>
             </a:fld>
             <a:endParaRPr lang="en-US"/>
           </a:p>
@@ -1883,7 +1890,7 @@
           <a:p>
             <a:fld id="{630F5BE5-B688-FF42-89B2-94D9E9242ADB}" type="datetimeFigureOut">
               <a:rPr lang="en-US" smtClean="0"/>
-              <a:t>10/21/16</a:t>
+              <a:t>10/24/16</a:t>
             </a:fld>
             <a:endParaRPr lang="en-US"/>
           </a:p>
@@ -1978,7 +1985,7 @@
           <a:p>
             <a:fld id="{630F5BE5-B688-FF42-89B2-94D9E9242ADB}" type="datetimeFigureOut">
               <a:rPr lang="en-US" smtClean="0"/>
-              <a:t>10/21/16</a:t>
+              <a:t>10/24/16</a:t>
             </a:fld>
             <a:endParaRPr lang="en-US"/>
           </a:p>
@@ -2255,7 +2262,7 @@
           <a:p>
             <a:fld id="{630F5BE5-B688-FF42-89B2-94D9E9242ADB}" type="datetimeFigureOut">
               <a:rPr lang="en-US" smtClean="0"/>
-              <a:t>10/21/16</a:t>
+              <a:t>10/24/16</a:t>
             </a:fld>
             <a:endParaRPr lang="en-US"/>
           </a:p>
@@ -2508,7 +2515,7 @@
           <a:p>
             <a:fld id="{630F5BE5-B688-FF42-89B2-94D9E9242ADB}" type="datetimeFigureOut">
               <a:rPr lang="en-US" smtClean="0"/>
-              <a:t>10/21/16</a:t>
+              <a:t>10/24/16</a:t>
             </a:fld>
             <a:endParaRPr lang="en-US"/>
           </a:p>
@@ -2721,7 +2728,7 @@
           <a:p>
             <a:fld id="{630F5BE5-B688-FF42-89B2-94D9E9242ADB}" type="datetimeFigureOut">
               <a:rPr lang="en-US" smtClean="0"/>
-              <a:t>10/21/16</a:t>
+              <a:t>10/24/16</a:t>
             </a:fld>
             <a:endParaRPr lang="en-US"/>
           </a:p>
@@ -3803,10 +3810,6 @@
               </a:rPr>
               <a:t>!</a:t>
             </a:r>
-            <a:endParaRPr lang="en-US" sz="2800" b="1" dirty="0">
-              <a:latin typeface="Avenir Black"/>
-              <a:cs typeface="Avenir Black"/>
-            </a:endParaRPr>
           </a:p>
         </p:txBody>
       </p:sp>
@@ -4544,6 +4547,3102 @@
       </p:par>
     </p:tnLst>
   </p:timing>
+</p:sld>
+</file>
+
+<file path=ppt/slides/slide3.xml><?xml version="1.0" encoding="utf-8"?>
+<p:sld xmlns:a="http://schemas.openxmlformats.org/drawingml/2006/main" xmlns:r="http://schemas.openxmlformats.org/officeDocument/2006/relationships" xmlns:p="http://schemas.openxmlformats.org/presentationml/2006/main">
+  <p:cSld>
+    <p:spTree>
+      <p:nvGrpSpPr>
+        <p:cNvPr id="1" name=""/>
+        <p:cNvGrpSpPr/>
+        <p:nvPr/>
+      </p:nvGrpSpPr>
+      <p:grpSpPr>
+        <a:xfrm>
+          <a:off x="0" y="0"/>
+          <a:ext cx="0" cy="0"/>
+          <a:chOff x="0" y="0"/>
+          <a:chExt cx="0" cy="0"/>
+        </a:xfrm>
+      </p:grpSpPr>
+      <p:pic>
+        <p:nvPicPr>
+          <p:cNvPr id="13" name="Picture 12" descr="macbook-apple-imac-computer-39284 (1).jpeg"/>
+          <p:cNvPicPr>
+            <a:picLocks noChangeAspect="1"/>
+          </p:cNvPicPr>
+          <p:nvPr/>
+        </p:nvPicPr>
+        <p:blipFill>
+          <a:blip r:embed="rId2">
+            <a:extLst>
+              <a:ext uri="{28A0092B-C50C-407E-A947-70E740481C1C}">
+                <a14:useLocalDpi xmlns:a14="http://schemas.microsoft.com/office/drawing/2010/main" val="0"/>
+              </a:ext>
+            </a:extLst>
+          </a:blip>
+          <a:stretch>
+            <a:fillRect/>
+          </a:stretch>
+        </p:blipFill>
+        <p:spPr>
+          <a:xfrm>
+            <a:off x="0" y="-369514"/>
+            <a:ext cx="6858000" cy="4552950"/>
+          </a:xfrm>
+          <a:prstGeom prst="rect">
+            <a:avLst/>
+          </a:prstGeom>
+        </p:spPr>
+      </p:pic>
+      <p:sp>
+        <p:nvSpPr>
+          <p:cNvPr id="14" name="Rectangle 13"/>
+          <p:cNvSpPr/>
+          <p:nvPr/>
+        </p:nvSpPr>
+        <p:spPr>
+          <a:xfrm>
+            <a:off x="-1" y="1738785"/>
+            <a:ext cx="6858001" cy="7599268"/>
+          </a:xfrm>
+          <a:prstGeom prst="rect">
+            <a:avLst/>
+          </a:prstGeom>
+          <a:solidFill>
+            <a:schemeClr val="bg1"/>
+          </a:solidFill>
+          <a:ln>
+            <a:solidFill>
+              <a:srgbClr val="7F7F7F"/>
+            </a:solidFill>
+          </a:ln>
+        </p:spPr>
+        <p:style>
+          <a:lnRef idx="1">
+            <a:schemeClr val="accent1"/>
+          </a:lnRef>
+          <a:fillRef idx="3">
+            <a:schemeClr val="accent1"/>
+          </a:fillRef>
+          <a:effectRef idx="2">
+            <a:schemeClr val="accent1"/>
+          </a:effectRef>
+          <a:fontRef idx="minor">
+            <a:schemeClr val="lt1"/>
+          </a:fontRef>
+        </p:style>
+        <p:txBody>
+          <a:bodyPr rtlCol="0" anchor="ctr"/>
+          <a:lstStyle/>
+          <a:p>
+            <a:pPr algn="ctr"/>
+            <a:endParaRPr lang="en-US"/>
+          </a:p>
+        </p:txBody>
+      </p:sp>
+      <p:sp>
+        <p:nvSpPr>
+          <p:cNvPr id="61" name="Rectangle 60"/>
+          <p:cNvSpPr/>
+          <p:nvPr/>
+        </p:nvSpPr>
+        <p:spPr>
+          <a:xfrm>
+            <a:off x="2902199" y="2920648"/>
+            <a:ext cx="1198875" cy="338554"/>
+          </a:xfrm>
+          <a:prstGeom prst="rect">
+            <a:avLst/>
+          </a:prstGeom>
+        </p:spPr>
+        <p:txBody>
+          <a:bodyPr wrap="none">
+            <a:spAutoFit/>
+          </a:bodyPr>
+          <a:lstStyle/>
+          <a:p>
+            <a:r>
+              <a:rPr lang="en-US" sz="1600" b="1" dirty="0" smtClean="0">
+                <a:latin typeface="Avenir Black"/>
+                <a:cs typeface="Avenir Black"/>
+              </a:rPr>
+              <a:t>Roger Pen</a:t>
+            </a:r>
+            <a:endParaRPr lang="en-US" sz="1600" b="1" dirty="0">
+              <a:latin typeface="Avenir Black"/>
+              <a:cs typeface="Avenir Black"/>
+            </a:endParaRPr>
+          </a:p>
+        </p:txBody>
+      </p:sp>
+      <p:sp>
+        <p:nvSpPr>
+          <p:cNvPr id="94" name="Rectangle 93"/>
+          <p:cNvSpPr/>
+          <p:nvPr/>
+        </p:nvSpPr>
+        <p:spPr>
+          <a:xfrm>
+            <a:off x="2902199" y="3259202"/>
+            <a:ext cx="3429000" cy="784830"/>
+          </a:xfrm>
+          <a:prstGeom prst="rect">
+            <a:avLst/>
+          </a:prstGeom>
+        </p:spPr>
+        <p:txBody>
+          <a:bodyPr>
+            <a:spAutoFit/>
+          </a:bodyPr>
+          <a:lstStyle/>
+          <a:p>
+            <a:r>
+              <a:rPr lang="en-US" dirty="0" smtClean="0"/>
+              <a:t>Days Requested: 30 Days </a:t>
+            </a:r>
+          </a:p>
+          <a:p>
+            <a:r>
+              <a:rPr lang="en-US" dirty="0" smtClean="0"/>
+              <a:t>Compatible: </a:t>
+            </a:r>
+            <a:r>
+              <a:rPr lang="en-US" dirty="0" err="1" smtClean="0"/>
+              <a:t>Naida</a:t>
+            </a:r>
+            <a:r>
+              <a:rPr lang="en-US" dirty="0" smtClean="0"/>
+              <a:t> Q90 </a:t>
+            </a:r>
+          </a:p>
+          <a:p>
+            <a:r>
+              <a:rPr lang="en-US" dirty="0" smtClean="0"/>
+              <a:t>Needs: </a:t>
+            </a:r>
+            <a:r>
+              <a:rPr lang="en-US" dirty="0" err="1" smtClean="0"/>
+              <a:t>Compilot</a:t>
+            </a:r>
+            <a:r>
+              <a:rPr lang="en-US" dirty="0" smtClean="0"/>
+              <a:t> and Roger X or Roger Battery</a:t>
+            </a:r>
+          </a:p>
+          <a:p>
+            <a:r>
+              <a:rPr lang="en-US" dirty="0" smtClean="0"/>
+              <a:t>8 Hour Battery Life </a:t>
+            </a:r>
+          </a:p>
+          <a:p>
+            <a:r>
+              <a:rPr lang="en-US" dirty="0" smtClean="0"/>
+              <a:t>Outlet rechargeable  </a:t>
+            </a:r>
+          </a:p>
+        </p:txBody>
+      </p:sp>
+      <p:sp>
+        <p:nvSpPr>
+          <p:cNvPr id="95" name="TextBox 94"/>
+          <p:cNvSpPr txBox="1"/>
+          <p:nvPr/>
+        </p:nvSpPr>
+        <p:spPr>
+          <a:xfrm>
+            <a:off x="308717" y="2166369"/>
+            <a:ext cx="3144453" cy="523220"/>
+          </a:xfrm>
+          <a:prstGeom prst="rect">
+            <a:avLst/>
+          </a:prstGeom>
+          <a:noFill/>
+        </p:spPr>
+        <p:txBody>
+          <a:bodyPr wrap="none" rtlCol="0">
+            <a:spAutoFit/>
+          </a:bodyPr>
+          <a:lstStyle/>
+          <a:p>
+            <a:r>
+              <a:rPr lang="en-US" sz="2800" b="1" dirty="0" smtClean="0">
+                <a:latin typeface="Avenir Black"/>
+                <a:cs typeface="Avenir Black"/>
+              </a:rPr>
+              <a:t>Item is Available! </a:t>
+            </a:r>
+            <a:endParaRPr lang="en-US" sz="2800" b="1" dirty="0">
+              <a:latin typeface="Avenir Black"/>
+              <a:cs typeface="Avenir Black"/>
+            </a:endParaRPr>
+          </a:p>
+        </p:txBody>
+      </p:sp>
+      <p:sp>
+        <p:nvSpPr>
+          <p:cNvPr id="38" name="Rectangle 37"/>
+          <p:cNvSpPr/>
+          <p:nvPr/>
+        </p:nvSpPr>
+        <p:spPr>
+          <a:xfrm>
+            <a:off x="2911968" y="4207785"/>
+            <a:ext cx="2388672" cy="545512"/>
+          </a:xfrm>
+          <a:prstGeom prst="rect">
+            <a:avLst/>
+          </a:prstGeom>
+          <a:solidFill>
+            <a:schemeClr val="bg1"/>
+          </a:solidFill>
+          <a:ln>
+            <a:solidFill>
+              <a:srgbClr val="7F7F7F"/>
+            </a:solidFill>
+          </a:ln>
+        </p:spPr>
+        <p:style>
+          <a:lnRef idx="1">
+            <a:schemeClr val="accent1"/>
+          </a:lnRef>
+          <a:fillRef idx="3">
+            <a:schemeClr val="accent1"/>
+          </a:fillRef>
+          <a:effectRef idx="2">
+            <a:schemeClr val="accent1"/>
+          </a:effectRef>
+          <a:fontRef idx="minor">
+            <a:schemeClr val="lt1"/>
+          </a:fontRef>
+        </p:style>
+        <p:txBody>
+          <a:bodyPr rtlCol="0" anchor="ctr"/>
+          <a:lstStyle/>
+          <a:p>
+            <a:pPr algn="ctr"/>
+            <a:r>
+              <a:rPr lang="en-US" sz="1600" dirty="0" smtClean="0">
+                <a:solidFill>
+                  <a:srgbClr val="000000"/>
+                </a:solidFill>
+              </a:rPr>
+              <a:t>Keep Shopping </a:t>
+            </a:r>
+            <a:endParaRPr lang="en-US" sz="1600" dirty="0">
+              <a:solidFill>
+                <a:srgbClr val="000000"/>
+              </a:solidFill>
+            </a:endParaRPr>
+          </a:p>
+        </p:txBody>
+      </p:sp>
+      <p:sp>
+        <p:nvSpPr>
+          <p:cNvPr id="39" name="Rectangle 38"/>
+          <p:cNvSpPr/>
+          <p:nvPr/>
+        </p:nvSpPr>
+        <p:spPr>
+          <a:xfrm>
+            <a:off x="2902199" y="4933946"/>
+            <a:ext cx="2398441" cy="545512"/>
+          </a:xfrm>
+          <a:prstGeom prst="rect">
+            <a:avLst/>
+          </a:prstGeom>
+          <a:solidFill>
+            <a:srgbClr val="8EB4E3"/>
+          </a:solidFill>
+          <a:ln>
+            <a:solidFill>
+              <a:srgbClr val="7F7F7F"/>
+            </a:solidFill>
+          </a:ln>
+        </p:spPr>
+        <p:style>
+          <a:lnRef idx="1">
+            <a:schemeClr val="accent1"/>
+          </a:lnRef>
+          <a:fillRef idx="3">
+            <a:schemeClr val="accent1"/>
+          </a:fillRef>
+          <a:effectRef idx="2">
+            <a:schemeClr val="accent1"/>
+          </a:effectRef>
+          <a:fontRef idx="minor">
+            <a:schemeClr val="lt1"/>
+          </a:fontRef>
+        </p:style>
+        <p:txBody>
+          <a:bodyPr rtlCol="0" anchor="ctr"/>
+          <a:lstStyle/>
+          <a:p>
+            <a:pPr algn="ctr"/>
+            <a:r>
+              <a:rPr lang="en-US" sz="1600" dirty="0" smtClean="0">
+                <a:solidFill>
+                  <a:srgbClr val="000000"/>
+                </a:solidFill>
+              </a:rPr>
+              <a:t>PROCEED TO CHECKOUT </a:t>
+            </a:r>
+            <a:endParaRPr lang="en-US" sz="1600" dirty="0">
+              <a:solidFill>
+                <a:srgbClr val="000000"/>
+              </a:solidFill>
+            </a:endParaRPr>
+          </a:p>
+        </p:txBody>
+      </p:sp>
+      <p:pic>
+        <p:nvPicPr>
+          <p:cNvPr id="2" name="Picture 1" descr="Screen Shot 2016-10-17 at 8.08.49 PM.png"/>
+          <p:cNvPicPr>
+            <a:picLocks noChangeAspect="1"/>
+          </p:cNvPicPr>
+          <p:nvPr/>
+        </p:nvPicPr>
+        <p:blipFill>
+          <a:blip r:embed="rId3">
+            <a:extLst>
+              <a:ext uri="{28A0092B-C50C-407E-A947-70E740481C1C}">
+                <a14:useLocalDpi xmlns:a14="http://schemas.microsoft.com/office/drawing/2010/main" val="0"/>
+              </a:ext>
+            </a:extLst>
+          </a:blip>
+          <a:stretch>
+            <a:fillRect/>
+          </a:stretch>
+        </p:blipFill>
+        <p:spPr>
+          <a:xfrm>
+            <a:off x="254697" y="2921876"/>
+            <a:ext cx="2328118" cy="1285909"/>
+          </a:xfrm>
+          <a:prstGeom prst="rect">
+            <a:avLst/>
+          </a:prstGeom>
+        </p:spPr>
+      </p:pic>
+    </p:spTree>
+    <p:extLst>
+      <p:ext uri="{BB962C8B-B14F-4D97-AF65-F5344CB8AC3E}">
+        <p14:creationId xmlns:p14="http://schemas.microsoft.com/office/powerpoint/2010/main" val="2865579100"/>
+      </p:ext>
+    </p:extLst>
+  </p:cSld>
+  <p:clrMapOvr>
+    <a:masterClrMapping/>
+  </p:clrMapOvr>
+</p:sld>
+</file>
+
+<file path=ppt/slides/slide4.xml><?xml version="1.0" encoding="utf-8"?>
+<p:sld xmlns:a="http://schemas.openxmlformats.org/drawingml/2006/main" xmlns:r="http://schemas.openxmlformats.org/officeDocument/2006/relationships" xmlns:p="http://schemas.openxmlformats.org/presentationml/2006/main">
+  <p:cSld>
+    <p:spTree>
+      <p:nvGrpSpPr>
+        <p:cNvPr id="1" name=""/>
+        <p:cNvGrpSpPr/>
+        <p:nvPr/>
+      </p:nvGrpSpPr>
+      <p:grpSpPr>
+        <a:xfrm>
+          <a:off x="0" y="0"/>
+          <a:ext cx="0" cy="0"/>
+          <a:chOff x="0" y="0"/>
+          <a:chExt cx="0" cy="0"/>
+        </a:xfrm>
+      </p:grpSpPr>
+      <p:sp>
+        <p:nvSpPr>
+          <p:cNvPr id="95" name="TextBox 94"/>
+          <p:cNvSpPr txBox="1"/>
+          <p:nvPr/>
+        </p:nvSpPr>
+        <p:spPr>
+          <a:xfrm>
+            <a:off x="457154" y="2277808"/>
+            <a:ext cx="928459" cy="523220"/>
+          </a:xfrm>
+          <a:prstGeom prst="rect">
+            <a:avLst/>
+          </a:prstGeom>
+          <a:noFill/>
+        </p:spPr>
+        <p:txBody>
+          <a:bodyPr wrap="none" rtlCol="0">
+            <a:spAutoFit/>
+          </a:bodyPr>
+          <a:lstStyle/>
+          <a:p>
+            <a:r>
+              <a:rPr lang="en-US" sz="2800" b="1" dirty="0" smtClean="0">
+                <a:latin typeface="Avenir Black"/>
+                <a:cs typeface="Avenir Black"/>
+              </a:rPr>
+              <a:t>Cart </a:t>
+            </a:r>
+            <a:endParaRPr lang="en-US" sz="2800" b="1" dirty="0">
+              <a:latin typeface="Avenir Black"/>
+              <a:cs typeface="Avenir Black"/>
+            </a:endParaRPr>
+          </a:p>
+        </p:txBody>
+      </p:sp>
+      <p:sp>
+        <p:nvSpPr>
+          <p:cNvPr id="12" name="Rectangle 11"/>
+          <p:cNvSpPr/>
+          <p:nvPr/>
+        </p:nvSpPr>
+        <p:spPr>
+          <a:xfrm>
+            <a:off x="457154" y="3109786"/>
+            <a:ext cx="1198875" cy="338554"/>
+          </a:xfrm>
+          <a:prstGeom prst="rect">
+            <a:avLst/>
+          </a:prstGeom>
+        </p:spPr>
+        <p:txBody>
+          <a:bodyPr wrap="none">
+            <a:spAutoFit/>
+          </a:bodyPr>
+          <a:lstStyle/>
+          <a:p>
+            <a:r>
+              <a:rPr lang="en-US" sz="1600" b="1" dirty="0" smtClean="0">
+                <a:latin typeface="Avenir Black"/>
+                <a:cs typeface="Avenir Black"/>
+              </a:rPr>
+              <a:t>Roger Pen </a:t>
+            </a:r>
+            <a:endParaRPr lang="en-US" sz="1600" b="1" dirty="0">
+              <a:latin typeface="Avenir Black"/>
+              <a:cs typeface="Avenir Black"/>
+            </a:endParaRPr>
+          </a:p>
+        </p:txBody>
+      </p:sp>
+      <p:sp>
+        <p:nvSpPr>
+          <p:cNvPr id="13" name="Rectangle 12"/>
+          <p:cNvSpPr/>
+          <p:nvPr/>
+        </p:nvSpPr>
+        <p:spPr>
+          <a:xfrm>
+            <a:off x="457154" y="3448340"/>
+            <a:ext cx="3429000" cy="646331"/>
+          </a:xfrm>
+          <a:prstGeom prst="rect">
+            <a:avLst/>
+          </a:prstGeom>
+        </p:spPr>
+        <p:txBody>
+          <a:bodyPr>
+            <a:spAutoFit/>
+          </a:bodyPr>
+          <a:lstStyle/>
+          <a:p>
+            <a:r>
+              <a:rPr lang="en-US" dirty="0"/>
+              <a:t>Days Requested: 30 </a:t>
+            </a:r>
+            <a:r>
+              <a:rPr lang="en-US" dirty="0" smtClean="0"/>
+              <a:t>Days</a:t>
+            </a:r>
+          </a:p>
+          <a:p>
+            <a:r>
+              <a:rPr lang="en-US" dirty="0" smtClean="0"/>
+              <a:t>Day Requested: 9/1/2016 </a:t>
+            </a:r>
+          </a:p>
+          <a:p>
+            <a:r>
+              <a:rPr lang="en-US" dirty="0" smtClean="0"/>
+              <a:t>End Day: 9/30/2016</a:t>
+            </a:r>
+            <a:endParaRPr lang="en-US" dirty="0"/>
+          </a:p>
+          <a:p>
+            <a:r>
+              <a:rPr lang="en-US" dirty="0" smtClean="0"/>
+              <a:t>Compatible</a:t>
+            </a:r>
+            <a:r>
+              <a:rPr lang="en-US" dirty="0"/>
+              <a:t>: </a:t>
+            </a:r>
+            <a:r>
+              <a:rPr lang="en-US" dirty="0" err="1"/>
+              <a:t>Naida</a:t>
+            </a:r>
+            <a:r>
+              <a:rPr lang="en-US" dirty="0"/>
+              <a:t> Q90 </a:t>
+            </a:r>
+          </a:p>
+        </p:txBody>
+      </p:sp>
+      <p:sp>
+        <p:nvSpPr>
+          <p:cNvPr id="15" name="Rectangle 14"/>
+          <p:cNvSpPr/>
+          <p:nvPr/>
+        </p:nvSpPr>
+        <p:spPr>
+          <a:xfrm>
+            <a:off x="457153" y="4324025"/>
+            <a:ext cx="2388672" cy="545512"/>
+          </a:xfrm>
+          <a:prstGeom prst="rect">
+            <a:avLst/>
+          </a:prstGeom>
+          <a:solidFill>
+            <a:schemeClr val="bg1"/>
+          </a:solidFill>
+          <a:ln>
+            <a:solidFill>
+              <a:srgbClr val="7F7F7F"/>
+            </a:solidFill>
+          </a:ln>
+        </p:spPr>
+        <p:style>
+          <a:lnRef idx="1">
+            <a:schemeClr val="accent1"/>
+          </a:lnRef>
+          <a:fillRef idx="3">
+            <a:schemeClr val="accent1"/>
+          </a:fillRef>
+          <a:effectRef idx="2">
+            <a:schemeClr val="accent1"/>
+          </a:effectRef>
+          <a:fontRef idx="minor">
+            <a:schemeClr val="lt1"/>
+          </a:fontRef>
+        </p:style>
+        <p:txBody>
+          <a:bodyPr rtlCol="0" anchor="ctr"/>
+          <a:lstStyle/>
+          <a:p>
+            <a:pPr algn="ctr"/>
+            <a:r>
+              <a:rPr lang="en-US" sz="1600" dirty="0" smtClean="0">
+                <a:solidFill>
+                  <a:srgbClr val="000000"/>
+                </a:solidFill>
+              </a:rPr>
+              <a:t>Keep Shopping </a:t>
+            </a:r>
+            <a:endParaRPr lang="en-US" sz="1600" dirty="0">
+              <a:solidFill>
+                <a:srgbClr val="000000"/>
+              </a:solidFill>
+            </a:endParaRPr>
+          </a:p>
+        </p:txBody>
+      </p:sp>
+      <p:sp>
+        <p:nvSpPr>
+          <p:cNvPr id="18" name="Rectangle 17"/>
+          <p:cNvSpPr/>
+          <p:nvPr/>
+        </p:nvSpPr>
+        <p:spPr>
+          <a:xfrm>
+            <a:off x="447384" y="5050186"/>
+            <a:ext cx="2398441" cy="545512"/>
+          </a:xfrm>
+          <a:prstGeom prst="rect">
+            <a:avLst/>
+          </a:prstGeom>
+          <a:solidFill>
+            <a:schemeClr val="tx2">
+              <a:lumMod val="40000"/>
+              <a:lumOff val="60000"/>
+            </a:schemeClr>
+          </a:solidFill>
+          <a:ln>
+            <a:solidFill>
+              <a:srgbClr val="7F7F7F"/>
+            </a:solidFill>
+          </a:ln>
+        </p:spPr>
+        <p:style>
+          <a:lnRef idx="1">
+            <a:schemeClr val="accent1"/>
+          </a:lnRef>
+          <a:fillRef idx="3">
+            <a:schemeClr val="accent1"/>
+          </a:fillRef>
+          <a:effectRef idx="2">
+            <a:schemeClr val="accent1"/>
+          </a:effectRef>
+          <a:fontRef idx="minor">
+            <a:schemeClr val="lt1"/>
+          </a:fontRef>
+        </p:style>
+        <p:txBody>
+          <a:bodyPr rtlCol="0" anchor="ctr"/>
+          <a:lstStyle/>
+          <a:p>
+            <a:pPr algn="ctr"/>
+            <a:r>
+              <a:rPr lang="en-US" sz="1600" dirty="0" smtClean="0">
+                <a:solidFill>
+                  <a:srgbClr val="000000"/>
+                </a:solidFill>
+              </a:rPr>
+              <a:t>PROCEED TO CHECKOUT </a:t>
+            </a:r>
+            <a:endParaRPr lang="en-US" sz="1600" dirty="0">
+              <a:solidFill>
+                <a:srgbClr val="000000"/>
+              </a:solidFill>
+            </a:endParaRPr>
+          </a:p>
+        </p:txBody>
+      </p:sp>
+      <p:pic>
+        <p:nvPicPr>
+          <p:cNvPr id="2" name="Picture 1" descr="Screen Shot 2016-10-17 at 6.20.27 PM.png"/>
+          <p:cNvPicPr>
+            <a:picLocks noChangeAspect="1"/>
+          </p:cNvPicPr>
+          <p:nvPr/>
+        </p:nvPicPr>
+        <p:blipFill>
+          <a:blip r:embed="rId2">
+            <a:extLst>
+              <a:ext uri="{28A0092B-C50C-407E-A947-70E740481C1C}">
+                <a14:useLocalDpi xmlns:a14="http://schemas.microsoft.com/office/drawing/2010/main" val="0"/>
+              </a:ext>
+            </a:extLst>
+          </a:blip>
+          <a:stretch>
+            <a:fillRect/>
+          </a:stretch>
+        </p:blipFill>
+        <p:spPr>
+          <a:xfrm>
+            <a:off x="-70492" y="-1"/>
+            <a:ext cx="6928492" cy="1684009"/>
+          </a:xfrm>
+          <a:prstGeom prst="rect">
+            <a:avLst/>
+          </a:prstGeom>
+        </p:spPr>
+      </p:pic>
+    </p:spTree>
+    <p:extLst>
+      <p:ext uri="{BB962C8B-B14F-4D97-AF65-F5344CB8AC3E}">
+        <p14:creationId xmlns:p14="http://schemas.microsoft.com/office/powerpoint/2010/main" val="528469356"/>
+      </p:ext>
+    </p:extLst>
+  </p:cSld>
+  <p:clrMapOvr>
+    <a:masterClrMapping/>
+  </p:clrMapOvr>
+</p:sld>
+</file>
+
+<file path=ppt/slides/slide5.xml><?xml version="1.0" encoding="utf-8"?>
+<p:sld xmlns:a="http://schemas.openxmlformats.org/drawingml/2006/main" xmlns:r="http://schemas.openxmlformats.org/officeDocument/2006/relationships" xmlns:p="http://schemas.openxmlformats.org/presentationml/2006/main">
+  <p:cSld>
+    <p:spTree>
+      <p:nvGrpSpPr>
+        <p:cNvPr id="1" name=""/>
+        <p:cNvGrpSpPr/>
+        <p:nvPr/>
+      </p:nvGrpSpPr>
+      <p:grpSpPr>
+        <a:xfrm>
+          <a:off x="0" y="0"/>
+          <a:ext cx="0" cy="0"/>
+          <a:chOff x="0" y="0"/>
+          <a:chExt cx="0" cy="0"/>
+        </a:xfrm>
+      </p:grpSpPr>
+      <p:sp>
+        <p:nvSpPr>
+          <p:cNvPr id="95" name="TextBox 94"/>
+          <p:cNvSpPr txBox="1"/>
+          <p:nvPr/>
+        </p:nvSpPr>
+        <p:spPr>
+          <a:xfrm>
+            <a:off x="458671" y="2085108"/>
+            <a:ext cx="1800493" cy="523220"/>
+          </a:xfrm>
+          <a:prstGeom prst="rect">
+            <a:avLst/>
+          </a:prstGeom>
+          <a:noFill/>
+        </p:spPr>
+        <p:txBody>
+          <a:bodyPr wrap="none" rtlCol="0">
+            <a:spAutoFit/>
+          </a:bodyPr>
+          <a:lstStyle/>
+          <a:p>
+            <a:r>
+              <a:rPr lang="en-US" sz="2800" b="1" dirty="0" smtClean="0">
+                <a:latin typeface="Avenir Black"/>
+                <a:cs typeface="Avenir Black"/>
+              </a:rPr>
+              <a:t>Checkout</a:t>
+            </a:r>
+            <a:endParaRPr lang="en-US" sz="2800" b="1" dirty="0">
+              <a:latin typeface="Avenir Black"/>
+              <a:cs typeface="Avenir Black"/>
+            </a:endParaRPr>
+          </a:p>
+        </p:txBody>
+      </p:sp>
+      <p:sp>
+        <p:nvSpPr>
+          <p:cNvPr id="12" name="Rectangle 11"/>
+          <p:cNvSpPr/>
+          <p:nvPr/>
+        </p:nvSpPr>
+        <p:spPr>
+          <a:xfrm>
+            <a:off x="458671" y="2917086"/>
+            <a:ext cx="2228472" cy="338554"/>
+          </a:xfrm>
+          <a:prstGeom prst="rect">
+            <a:avLst/>
+          </a:prstGeom>
+        </p:spPr>
+        <p:txBody>
+          <a:bodyPr wrap="none">
+            <a:spAutoFit/>
+          </a:bodyPr>
+          <a:lstStyle/>
+          <a:p>
+            <a:r>
+              <a:rPr lang="en-US" sz="1600" b="1" dirty="0" smtClean="0">
+                <a:latin typeface="Avenir Black"/>
+                <a:cs typeface="Avenir Black"/>
+              </a:rPr>
+              <a:t>Shipping Information </a:t>
+            </a:r>
+            <a:endParaRPr lang="en-US" sz="1600" b="1" dirty="0">
+              <a:latin typeface="Avenir Black"/>
+              <a:cs typeface="Avenir Black"/>
+            </a:endParaRPr>
+          </a:p>
+        </p:txBody>
+      </p:sp>
+      <p:sp>
+        <p:nvSpPr>
+          <p:cNvPr id="13" name="Rectangle 12"/>
+          <p:cNvSpPr/>
+          <p:nvPr/>
+        </p:nvSpPr>
+        <p:spPr>
+          <a:xfrm>
+            <a:off x="458671" y="3255640"/>
+            <a:ext cx="3429000" cy="507831"/>
+          </a:xfrm>
+          <a:prstGeom prst="rect">
+            <a:avLst/>
+          </a:prstGeom>
+        </p:spPr>
+        <p:txBody>
+          <a:bodyPr>
+            <a:spAutoFit/>
+          </a:bodyPr>
+          <a:lstStyle/>
+          <a:p>
+            <a:r>
+              <a:rPr lang="en-US" dirty="0" err="1" smtClean="0"/>
+              <a:t>Eloy</a:t>
+            </a:r>
+            <a:r>
+              <a:rPr lang="en-US" dirty="0" smtClean="0"/>
+              <a:t> Ortega </a:t>
+            </a:r>
+          </a:p>
+          <a:p>
+            <a:r>
+              <a:rPr lang="en-US" dirty="0" smtClean="0"/>
+              <a:t>25 Chamber Street #430 </a:t>
+            </a:r>
+          </a:p>
+          <a:p>
+            <a:r>
+              <a:rPr lang="en-US" dirty="0" smtClean="0"/>
+              <a:t>Brooklyn NY 12345</a:t>
+            </a:r>
+          </a:p>
+        </p:txBody>
+      </p:sp>
+      <p:sp>
+        <p:nvSpPr>
+          <p:cNvPr id="15" name="Rectangle 14"/>
+          <p:cNvSpPr/>
+          <p:nvPr/>
+        </p:nvSpPr>
+        <p:spPr>
+          <a:xfrm>
+            <a:off x="458671" y="5413481"/>
+            <a:ext cx="2226955" cy="545512"/>
+          </a:xfrm>
+          <a:prstGeom prst="rect">
+            <a:avLst/>
+          </a:prstGeom>
+          <a:solidFill>
+            <a:srgbClr val="8EB4E3"/>
+          </a:solidFill>
+          <a:ln>
+            <a:solidFill>
+              <a:srgbClr val="7F7F7F"/>
+            </a:solidFill>
+          </a:ln>
+        </p:spPr>
+        <p:style>
+          <a:lnRef idx="1">
+            <a:schemeClr val="accent1"/>
+          </a:lnRef>
+          <a:fillRef idx="3">
+            <a:schemeClr val="accent1"/>
+          </a:fillRef>
+          <a:effectRef idx="2">
+            <a:schemeClr val="accent1"/>
+          </a:effectRef>
+          <a:fontRef idx="minor">
+            <a:schemeClr val="lt1"/>
+          </a:fontRef>
+        </p:style>
+        <p:txBody>
+          <a:bodyPr rtlCol="0" anchor="ctr"/>
+          <a:lstStyle/>
+          <a:p>
+            <a:pPr algn="ctr"/>
+            <a:r>
+              <a:rPr lang="en-US" sz="1600" dirty="0" smtClean="0">
+                <a:solidFill>
+                  <a:srgbClr val="000000"/>
+                </a:solidFill>
+              </a:rPr>
+              <a:t>PROCEED TO CHECKOUT</a:t>
+            </a:r>
+            <a:endParaRPr lang="en-US" sz="1600" dirty="0">
+              <a:solidFill>
+                <a:srgbClr val="000000"/>
+              </a:solidFill>
+            </a:endParaRPr>
+          </a:p>
+        </p:txBody>
+      </p:sp>
+      <p:sp>
+        <p:nvSpPr>
+          <p:cNvPr id="11" name="Rectangle 10"/>
+          <p:cNvSpPr/>
+          <p:nvPr/>
+        </p:nvSpPr>
+        <p:spPr>
+          <a:xfrm>
+            <a:off x="458671" y="4111015"/>
+            <a:ext cx="1198875" cy="338554"/>
+          </a:xfrm>
+          <a:prstGeom prst="rect">
+            <a:avLst/>
+          </a:prstGeom>
+        </p:spPr>
+        <p:txBody>
+          <a:bodyPr wrap="none">
+            <a:spAutoFit/>
+          </a:bodyPr>
+          <a:lstStyle/>
+          <a:p>
+            <a:r>
+              <a:rPr lang="en-US" sz="1600" b="1" dirty="0" smtClean="0">
+                <a:latin typeface="Avenir Black"/>
+                <a:cs typeface="Avenir Black"/>
+              </a:rPr>
+              <a:t>Roger Pen </a:t>
+            </a:r>
+            <a:endParaRPr lang="en-US" sz="1600" b="1" dirty="0">
+              <a:latin typeface="Avenir Black"/>
+              <a:cs typeface="Avenir Black"/>
+            </a:endParaRPr>
+          </a:p>
+        </p:txBody>
+      </p:sp>
+      <p:sp>
+        <p:nvSpPr>
+          <p:cNvPr id="17" name="Rectangle 16"/>
+          <p:cNvSpPr/>
+          <p:nvPr/>
+        </p:nvSpPr>
+        <p:spPr>
+          <a:xfrm>
+            <a:off x="458671" y="4449569"/>
+            <a:ext cx="1519903" cy="646331"/>
+          </a:xfrm>
+          <a:prstGeom prst="rect">
+            <a:avLst/>
+          </a:prstGeom>
+        </p:spPr>
+        <p:txBody>
+          <a:bodyPr wrap="square">
+            <a:spAutoFit/>
+          </a:bodyPr>
+          <a:lstStyle/>
+          <a:p>
+            <a:r>
+              <a:rPr lang="en-US" dirty="0"/>
+              <a:t>Days Requested: 30 Days</a:t>
+            </a:r>
+          </a:p>
+          <a:p>
+            <a:r>
+              <a:rPr lang="en-US" dirty="0"/>
+              <a:t>Day Requested: 9/1/2016 </a:t>
+            </a:r>
+          </a:p>
+          <a:p>
+            <a:r>
+              <a:rPr lang="en-US" dirty="0"/>
+              <a:t>End Day: 9/30/2016</a:t>
+            </a:r>
+          </a:p>
+          <a:p>
+            <a:r>
+              <a:rPr lang="en-US" dirty="0"/>
+              <a:t>Compatible: </a:t>
+            </a:r>
+            <a:r>
+              <a:rPr lang="en-US" dirty="0" err="1"/>
+              <a:t>Naida</a:t>
+            </a:r>
+            <a:r>
+              <a:rPr lang="en-US" dirty="0"/>
+              <a:t> Q90 </a:t>
+            </a:r>
+          </a:p>
+        </p:txBody>
+      </p:sp>
+      <p:pic>
+        <p:nvPicPr>
+          <p:cNvPr id="2" name="Picture 1" descr="Screen Shot 2016-10-17 at 6.20.27 PM.png"/>
+          <p:cNvPicPr>
+            <a:picLocks noChangeAspect="1"/>
+          </p:cNvPicPr>
+          <p:nvPr/>
+        </p:nvPicPr>
+        <p:blipFill>
+          <a:blip r:embed="rId2">
+            <a:extLst>
+              <a:ext uri="{28A0092B-C50C-407E-A947-70E740481C1C}">
+                <a14:useLocalDpi xmlns:a14="http://schemas.microsoft.com/office/drawing/2010/main" val="0"/>
+              </a:ext>
+            </a:extLst>
+          </a:blip>
+          <a:stretch>
+            <a:fillRect/>
+          </a:stretch>
+        </p:blipFill>
+        <p:spPr>
+          <a:xfrm>
+            <a:off x="0" y="2408"/>
+            <a:ext cx="6858000" cy="1666875"/>
+          </a:xfrm>
+          <a:prstGeom prst="rect">
+            <a:avLst/>
+          </a:prstGeom>
+        </p:spPr>
+      </p:pic>
+    </p:spTree>
+    <p:extLst>
+      <p:ext uri="{BB962C8B-B14F-4D97-AF65-F5344CB8AC3E}">
+        <p14:creationId xmlns:p14="http://schemas.microsoft.com/office/powerpoint/2010/main" val="2406351661"/>
+      </p:ext>
+    </p:extLst>
+  </p:cSld>
+  <p:clrMapOvr>
+    <a:masterClrMapping/>
+  </p:clrMapOvr>
+</p:sld>
+</file>
+
+<file path=ppt/slides/slide6.xml><?xml version="1.0" encoding="utf-8"?>
+<p:sld xmlns:a="http://schemas.openxmlformats.org/drawingml/2006/main" xmlns:r="http://schemas.openxmlformats.org/officeDocument/2006/relationships" xmlns:p="http://schemas.openxmlformats.org/presentationml/2006/main">
+  <p:cSld>
+    <p:spTree>
+      <p:nvGrpSpPr>
+        <p:cNvPr id="1" name=""/>
+        <p:cNvGrpSpPr/>
+        <p:nvPr/>
+      </p:nvGrpSpPr>
+      <p:grpSpPr>
+        <a:xfrm>
+          <a:off x="0" y="0"/>
+          <a:ext cx="0" cy="0"/>
+          <a:chOff x="0" y="0"/>
+          <a:chExt cx="0" cy="0"/>
+        </a:xfrm>
+      </p:grpSpPr>
+      <p:sp>
+        <p:nvSpPr>
+          <p:cNvPr id="95" name="TextBox 94"/>
+          <p:cNvSpPr txBox="1"/>
+          <p:nvPr/>
+        </p:nvSpPr>
+        <p:spPr>
+          <a:xfrm>
+            <a:off x="458671" y="2467565"/>
+            <a:ext cx="2085922" cy="523220"/>
+          </a:xfrm>
+          <a:prstGeom prst="rect">
+            <a:avLst/>
+          </a:prstGeom>
+          <a:noFill/>
+        </p:spPr>
+        <p:txBody>
+          <a:bodyPr wrap="none" rtlCol="0">
+            <a:spAutoFit/>
+          </a:bodyPr>
+          <a:lstStyle/>
+          <a:p>
+            <a:r>
+              <a:rPr lang="en-US" sz="2800" b="1" dirty="0" smtClean="0">
+                <a:latin typeface="Avenir Black"/>
+                <a:cs typeface="Avenir Black"/>
+              </a:rPr>
+              <a:t>Thank you! </a:t>
+            </a:r>
+            <a:endParaRPr lang="en-US" sz="2800" b="1" dirty="0">
+              <a:latin typeface="Avenir Black"/>
+              <a:cs typeface="Avenir Black"/>
+            </a:endParaRPr>
+          </a:p>
+        </p:txBody>
+      </p:sp>
+      <p:sp>
+        <p:nvSpPr>
+          <p:cNvPr id="12" name="Rectangle 11"/>
+          <p:cNvSpPr/>
+          <p:nvPr/>
+        </p:nvSpPr>
+        <p:spPr>
+          <a:xfrm>
+            <a:off x="458671" y="3299543"/>
+            <a:ext cx="5515777" cy="338554"/>
+          </a:xfrm>
+          <a:prstGeom prst="rect">
+            <a:avLst/>
+          </a:prstGeom>
+        </p:spPr>
+        <p:txBody>
+          <a:bodyPr wrap="none">
+            <a:spAutoFit/>
+          </a:bodyPr>
+          <a:lstStyle/>
+          <a:p>
+            <a:r>
+              <a:rPr lang="en-US" sz="1600" b="1" dirty="0" smtClean="0">
+                <a:latin typeface="Avenir Black"/>
+                <a:cs typeface="Avenir Black"/>
+              </a:rPr>
+              <a:t>Your order information will be sent in an email shortly! </a:t>
+            </a:r>
+            <a:endParaRPr lang="en-US" sz="1600" b="1" dirty="0">
+              <a:latin typeface="Avenir Black"/>
+              <a:cs typeface="Avenir Black"/>
+            </a:endParaRPr>
+          </a:p>
+        </p:txBody>
+      </p:sp>
+      <p:pic>
+        <p:nvPicPr>
+          <p:cNvPr id="2" name="Picture 1" descr="Screen Shot 2016-10-17 at 6.20.27 PM.png"/>
+          <p:cNvPicPr>
+            <a:picLocks noChangeAspect="1"/>
+          </p:cNvPicPr>
+          <p:nvPr/>
+        </p:nvPicPr>
+        <p:blipFill>
+          <a:blip r:embed="rId2">
+            <a:extLst>
+              <a:ext uri="{28A0092B-C50C-407E-A947-70E740481C1C}">
+                <a14:useLocalDpi xmlns:a14="http://schemas.microsoft.com/office/drawing/2010/main" val="0"/>
+              </a:ext>
+            </a:extLst>
+          </a:blip>
+          <a:stretch>
+            <a:fillRect/>
+          </a:stretch>
+        </p:blipFill>
+        <p:spPr>
+          <a:xfrm>
+            <a:off x="0" y="-1"/>
+            <a:ext cx="6858000" cy="1666875"/>
+          </a:xfrm>
+          <a:prstGeom prst="rect">
+            <a:avLst/>
+          </a:prstGeom>
+        </p:spPr>
+      </p:pic>
+    </p:spTree>
+    <p:extLst>
+      <p:ext uri="{BB962C8B-B14F-4D97-AF65-F5344CB8AC3E}">
+        <p14:creationId xmlns:p14="http://schemas.microsoft.com/office/powerpoint/2010/main" val="927013140"/>
+      </p:ext>
+    </p:extLst>
+  </p:cSld>
+  <p:clrMapOvr>
+    <a:masterClrMapping/>
+  </p:clrMapOvr>
+</p:sld>
+</file>
+
+<file path=ppt/slides/slide7.xml><?xml version="1.0" encoding="utf-8"?>
+<p:sld xmlns:a="http://schemas.openxmlformats.org/drawingml/2006/main" xmlns:r="http://schemas.openxmlformats.org/officeDocument/2006/relationships" xmlns:p="http://schemas.openxmlformats.org/presentationml/2006/main">
+  <p:cSld>
+    <p:spTree>
+      <p:nvGrpSpPr>
+        <p:cNvPr id="1" name=""/>
+        <p:cNvGrpSpPr/>
+        <p:nvPr/>
+      </p:nvGrpSpPr>
+      <p:grpSpPr>
+        <a:xfrm>
+          <a:off x="0" y="0"/>
+          <a:ext cx="0" cy="0"/>
+          <a:chOff x="0" y="0"/>
+          <a:chExt cx="0" cy="0"/>
+        </a:xfrm>
+      </p:grpSpPr>
+      <p:pic>
+        <p:nvPicPr>
+          <p:cNvPr id="4" name="Picture 3" descr="macbook-apple-imac-computer-39284 (1).jpeg"/>
+          <p:cNvPicPr>
+            <a:picLocks noChangeAspect="1"/>
+          </p:cNvPicPr>
+          <p:nvPr/>
+        </p:nvPicPr>
+        <p:blipFill>
+          <a:blip r:embed="rId2">
+            <a:extLst>
+              <a:ext uri="{28A0092B-C50C-407E-A947-70E740481C1C}">
+                <a14:useLocalDpi xmlns:a14="http://schemas.microsoft.com/office/drawing/2010/main" val="0"/>
+              </a:ext>
+            </a:extLst>
+          </a:blip>
+          <a:stretch>
+            <a:fillRect/>
+          </a:stretch>
+        </p:blipFill>
+        <p:spPr>
+          <a:xfrm>
+            <a:off x="0" y="-369514"/>
+            <a:ext cx="6858000" cy="4552950"/>
+          </a:xfrm>
+          <a:prstGeom prst="rect">
+            <a:avLst/>
+          </a:prstGeom>
+        </p:spPr>
+      </p:pic>
+      <p:sp>
+        <p:nvSpPr>
+          <p:cNvPr id="5" name="Rectangle 4"/>
+          <p:cNvSpPr/>
+          <p:nvPr/>
+        </p:nvSpPr>
+        <p:spPr>
+          <a:xfrm>
+            <a:off x="0" y="1365947"/>
+            <a:ext cx="6858000" cy="8644553"/>
+          </a:xfrm>
+          <a:prstGeom prst="rect">
+            <a:avLst/>
+          </a:prstGeom>
+          <a:ln/>
+          <a:effectLst/>
+        </p:spPr>
+        <p:style>
+          <a:lnRef idx="2">
+            <a:schemeClr val="dk1"/>
+          </a:lnRef>
+          <a:fillRef idx="1">
+            <a:schemeClr val="lt1"/>
+          </a:fillRef>
+          <a:effectRef idx="0">
+            <a:schemeClr val="dk1"/>
+          </a:effectRef>
+          <a:fontRef idx="minor">
+            <a:schemeClr val="dk1"/>
+          </a:fontRef>
+        </p:style>
+        <p:txBody>
+          <a:bodyPr rtlCol="0" anchor="ctr"/>
+          <a:lstStyle/>
+          <a:p>
+            <a:pPr algn="ctr"/>
+            <a:endParaRPr lang="en-US"/>
+          </a:p>
+        </p:txBody>
+      </p:sp>
+      <p:sp>
+        <p:nvSpPr>
+          <p:cNvPr id="28" name="Rectangle 27"/>
+          <p:cNvSpPr/>
+          <p:nvPr/>
+        </p:nvSpPr>
+        <p:spPr>
+          <a:xfrm>
+            <a:off x="458671" y="3150242"/>
+            <a:ext cx="1570065" cy="335155"/>
+          </a:xfrm>
+          <a:prstGeom prst="rect">
+            <a:avLst/>
+          </a:prstGeom>
+          <a:solidFill>
+            <a:schemeClr val="bg1"/>
+          </a:solidFill>
+          <a:ln>
+            <a:solidFill>
+              <a:srgbClr val="000000"/>
+            </a:solidFill>
+          </a:ln>
+        </p:spPr>
+        <p:style>
+          <a:lnRef idx="1">
+            <a:schemeClr val="accent1"/>
+          </a:lnRef>
+          <a:fillRef idx="3">
+            <a:schemeClr val="accent1"/>
+          </a:fillRef>
+          <a:effectRef idx="2">
+            <a:schemeClr val="accent1"/>
+          </a:effectRef>
+          <a:fontRef idx="minor">
+            <a:schemeClr val="lt1"/>
+          </a:fontRef>
+        </p:style>
+        <p:txBody>
+          <a:bodyPr rtlCol="0" anchor="ctr"/>
+          <a:lstStyle/>
+          <a:p>
+            <a:pPr algn="ctr"/>
+            <a:r>
+              <a:rPr lang="en-US" sz="1400" dirty="0" smtClean="0">
+                <a:solidFill>
+                  <a:srgbClr val="000000"/>
+                </a:solidFill>
+                <a:latin typeface="Avenir Book"/>
+                <a:cs typeface="Avenir Book"/>
+              </a:rPr>
+              <a:t>Service Type </a:t>
+            </a:r>
+            <a:endParaRPr lang="en-US" sz="1400" dirty="0">
+              <a:solidFill>
+                <a:srgbClr val="000000"/>
+              </a:solidFill>
+              <a:latin typeface="Avenir Book"/>
+              <a:cs typeface="Avenir Book"/>
+            </a:endParaRPr>
+          </a:p>
+        </p:txBody>
+      </p:sp>
+      <p:sp>
+        <p:nvSpPr>
+          <p:cNvPr id="29" name="Rectangle 28"/>
+          <p:cNvSpPr/>
+          <p:nvPr/>
+        </p:nvSpPr>
+        <p:spPr>
+          <a:xfrm>
+            <a:off x="2028736" y="3150242"/>
+            <a:ext cx="1570065" cy="335155"/>
+          </a:xfrm>
+          <a:prstGeom prst="rect">
+            <a:avLst/>
+          </a:prstGeom>
+          <a:solidFill>
+            <a:schemeClr val="bg1"/>
+          </a:solidFill>
+          <a:ln>
+            <a:solidFill>
+              <a:srgbClr val="000000"/>
+            </a:solidFill>
+          </a:ln>
+        </p:spPr>
+        <p:style>
+          <a:lnRef idx="1">
+            <a:schemeClr val="accent1"/>
+          </a:lnRef>
+          <a:fillRef idx="3">
+            <a:schemeClr val="accent1"/>
+          </a:fillRef>
+          <a:effectRef idx="2">
+            <a:schemeClr val="accent1"/>
+          </a:effectRef>
+          <a:fontRef idx="minor">
+            <a:schemeClr val="lt1"/>
+          </a:fontRef>
+        </p:style>
+        <p:txBody>
+          <a:bodyPr rtlCol="0" anchor="ctr"/>
+          <a:lstStyle/>
+          <a:p>
+            <a:pPr algn="ctr"/>
+            <a:r>
+              <a:rPr lang="en-US" sz="1400" dirty="0" smtClean="0">
+                <a:solidFill>
+                  <a:srgbClr val="000000"/>
+                </a:solidFill>
+                <a:latin typeface="Avenir Book"/>
+                <a:cs typeface="Avenir Book"/>
+              </a:rPr>
+              <a:t>Receive Date </a:t>
+            </a:r>
+            <a:endParaRPr lang="en-US" sz="1400" dirty="0">
+              <a:solidFill>
+                <a:srgbClr val="000000"/>
+              </a:solidFill>
+              <a:latin typeface="Avenir Book"/>
+              <a:cs typeface="Avenir Book"/>
+            </a:endParaRPr>
+          </a:p>
+        </p:txBody>
+      </p:sp>
+      <p:sp>
+        <p:nvSpPr>
+          <p:cNvPr id="30" name="Rectangle 29"/>
+          <p:cNvSpPr/>
+          <p:nvPr/>
+        </p:nvSpPr>
+        <p:spPr>
+          <a:xfrm>
+            <a:off x="3598801" y="3150242"/>
+            <a:ext cx="1570065" cy="335155"/>
+          </a:xfrm>
+          <a:prstGeom prst="rect">
+            <a:avLst/>
+          </a:prstGeom>
+          <a:solidFill>
+            <a:schemeClr val="bg1"/>
+          </a:solidFill>
+          <a:ln>
+            <a:solidFill>
+              <a:srgbClr val="000000"/>
+            </a:solidFill>
+          </a:ln>
+        </p:spPr>
+        <p:style>
+          <a:lnRef idx="1">
+            <a:schemeClr val="accent1"/>
+          </a:lnRef>
+          <a:fillRef idx="3">
+            <a:schemeClr val="accent1"/>
+          </a:fillRef>
+          <a:effectRef idx="2">
+            <a:schemeClr val="accent1"/>
+          </a:effectRef>
+          <a:fontRef idx="minor">
+            <a:schemeClr val="lt1"/>
+          </a:fontRef>
+        </p:style>
+        <p:txBody>
+          <a:bodyPr rtlCol="0" anchor="ctr"/>
+          <a:lstStyle/>
+          <a:p>
+            <a:pPr algn="ctr"/>
+            <a:r>
+              <a:rPr lang="en-US" sz="1400" dirty="0" smtClean="0">
+                <a:solidFill>
+                  <a:srgbClr val="000000"/>
+                </a:solidFill>
+                <a:latin typeface="Avenir Book"/>
+                <a:cs typeface="Avenir Book"/>
+              </a:rPr>
+              <a:t>Return Date </a:t>
+            </a:r>
+            <a:endParaRPr lang="en-US" sz="1400" dirty="0">
+              <a:solidFill>
+                <a:srgbClr val="000000"/>
+              </a:solidFill>
+              <a:latin typeface="Avenir Book"/>
+              <a:cs typeface="Avenir Book"/>
+            </a:endParaRPr>
+          </a:p>
+        </p:txBody>
+      </p:sp>
+      <p:sp>
+        <p:nvSpPr>
+          <p:cNvPr id="31" name="Rectangle 30"/>
+          <p:cNvSpPr/>
+          <p:nvPr/>
+        </p:nvSpPr>
+        <p:spPr>
+          <a:xfrm>
+            <a:off x="5168867" y="3150242"/>
+            <a:ext cx="1164310" cy="335155"/>
+          </a:xfrm>
+          <a:prstGeom prst="rect">
+            <a:avLst/>
+          </a:prstGeom>
+          <a:solidFill>
+            <a:schemeClr val="tx2">
+              <a:lumMod val="60000"/>
+              <a:lumOff val="40000"/>
+            </a:schemeClr>
+          </a:solidFill>
+          <a:ln>
+            <a:solidFill>
+              <a:srgbClr val="000000"/>
+            </a:solidFill>
+          </a:ln>
+        </p:spPr>
+        <p:style>
+          <a:lnRef idx="1">
+            <a:schemeClr val="accent1"/>
+          </a:lnRef>
+          <a:fillRef idx="3">
+            <a:schemeClr val="accent1"/>
+          </a:fillRef>
+          <a:effectRef idx="2">
+            <a:schemeClr val="accent1"/>
+          </a:effectRef>
+          <a:fontRef idx="minor">
+            <a:schemeClr val="lt1"/>
+          </a:fontRef>
+        </p:style>
+        <p:txBody>
+          <a:bodyPr rtlCol="0" anchor="ctr"/>
+          <a:lstStyle/>
+          <a:p>
+            <a:pPr algn="ctr"/>
+            <a:r>
+              <a:rPr lang="en-US" sz="1400" dirty="0" smtClean="0">
+                <a:solidFill>
+                  <a:srgbClr val="000000"/>
+                </a:solidFill>
+                <a:latin typeface="Avenir Book"/>
+                <a:cs typeface="Avenir Book"/>
+              </a:rPr>
+              <a:t>Search</a:t>
+            </a:r>
+            <a:endParaRPr lang="en-US" sz="1400" dirty="0">
+              <a:solidFill>
+                <a:srgbClr val="000000"/>
+              </a:solidFill>
+              <a:latin typeface="Avenir Book"/>
+              <a:cs typeface="Avenir Book"/>
+            </a:endParaRPr>
+          </a:p>
+        </p:txBody>
+      </p:sp>
+      <p:cxnSp>
+        <p:nvCxnSpPr>
+          <p:cNvPr id="48" name="Straight Connector 47"/>
+          <p:cNvCxnSpPr/>
+          <p:nvPr/>
+        </p:nvCxnSpPr>
+        <p:spPr>
+          <a:xfrm flipH="1" flipV="1">
+            <a:off x="0" y="1354667"/>
+            <a:ext cx="6858000" cy="11280"/>
+          </a:xfrm>
+          <a:prstGeom prst="line">
+            <a:avLst/>
+          </a:prstGeom>
+          <a:ln w="3175" cmpd="sng">
+            <a:solidFill>
+              <a:srgbClr val="7F7F7F"/>
+            </a:solidFill>
+          </a:ln>
+          <a:effectLst/>
+        </p:spPr>
+        <p:style>
+          <a:lnRef idx="2">
+            <a:schemeClr val="accent1"/>
+          </a:lnRef>
+          <a:fillRef idx="0">
+            <a:schemeClr val="accent1"/>
+          </a:fillRef>
+          <a:effectRef idx="1">
+            <a:schemeClr val="accent1"/>
+          </a:effectRef>
+          <a:fontRef idx="minor">
+            <a:schemeClr val="tx1"/>
+          </a:fontRef>
+        </p:style>
+      </p:cxnSp>
+      <p:cxnSp>
+        <p:nvCxnSpPr>
+          <p:cNvPr id="60" name="Straight Connector 59"/>
+          <p:cNvCxnSpPr/>
+          <p:nvPr/>
+        </p:nvCxnSpPr>
+        <p:spPr>
+          <a:xfrm flipH="1" flipV="1">
+            <a:off x="1" y="4061144"/>
+            <a:ext cx="6858000" cy="11280"/>
+          </a:xfrm>
+          <a:prstGeom prst="line">
+            <a:avLst/>
+          </a:prstGeom>
+          <a:ln w="3175" cmpd="sng">
+            <a:solidFill>
+              <a:srgbClr val="7F7F7F"/>
+            </a:solidFill>
+          </a:ln>
+          <a:effectLst/>
+        </p:spPr>
+        <p:style>
+          <a:lnRef idx="2">
+            <a:schemeClr val="accent1"/>
+          </a:lnRef>
+          <a:fillRef idx="0">
+            <a:schemeClr val="accent1"/>
+          </a:fillRef>
+          <a:effectRef idx="1">
+            <a:schemeClr val="accent1"/>
+          </a:effectRef>
+          <a:fontRef idx="minor">
+            <a:schemeClr val="tx1"/>
+          </a:fontRef>
+        </p:style>
+      </p:cxnSp>
+      <p:sp>
+        <p:nvSpPr>
+          <p:cNvPr id="61" name="Rectangle 60"/>
+          <p:cNvSpPr/>
+          <p:nvPr/>
+        </p:nvSpPr>
+        <p:spPr>
+          <a:xfrm>
+            <a:off x="3052153" y="4937715"/>
+            <a:ext cx="1069524" cy="338554"/>
+          </a:xfrm>
+          <a:prstGeom prst="rect">
+            <a:avLst/>
+          </a:prstGeom>
+        </p:spPr>
+        <p:txBody>
+          <a:bodyPr wrap="none">
+            <a:spAutoFit/>
+          </a:bodyPr>
+          <a:lstStyle/>
+          <a:p>
+            <a:r>
+              <a:rPr lang="en-US" sz="1600" b="1" dirty="0" smtClean="0">
+                <a:latin typeface="Avenir Black"/>
+                <a:cs typeface="Avenir Black"/>
+              </a:rPr>
+              <a:t>FM Units </a:t>
+            </a:r>
+            <a:endParaRPr lang="en-US" sz="1600" b="1" dirty="0">
+              <a:latin typeface="Avenir Black"/>
+              <a:cs typeface="Avenir Black"/>
+            </a:endParaRPr>
+          </a:p>
+        </p:txBody>
+      </p:sp>
+      <p:sp>
+        <p:nvSpPr>
+          <p:cNvPr id="78" name="Rectangle 77"/>
+          <p:cNvSpPr/>
+          <p:nvPr/>
+        </p:nvSpPr>
+        <p:spPr>
+          <a:xfrm>
+            <a:off x="3052153" y="6438268"/>
+            <a:ext cx="1659429" cy="338554"/>
+          </a:xfrm>
+          <a:prstGeom prst="rect">
+            <a:avLst/>
+          </a:prstGeom>
+        </p:spPr>
+        <p:txBody>
+          <a:bodyPr wrap="none">
+            <a:spAutoFit/>
+          </a:bodyPr>
+          <a:lstStyle/>
+          <a:p>
+            <a:r>
+              <a:rPr lang="en-US" sz="1600" b="1" dirty="0" smtClean="0">
+                <a:latin typeface="Avenir Black"/>
+                <a:cs typeface="Avenir Black"/>
+              </a:rPr>
+              <a:t>CART Reporter</a:t>
+            </a:r>
+            <a:endParaRPr lang="en-US" sz="1600" b="1" dirty="0">
+              <a:latin typeface="Avenir Black"/>
+              <a:cs typeface="Avenir Black"/>
+            </a:endParaRPr>
+          </a:p>
+        </p:txBody>
+      </p:sp>
+      <p:sp>
+        <p:nvSpPr>
+          <p:cNvPr id="92" name="Rectangle 91"/>
+          <p:cNvSpPr/>
+          <p:nvPr/>
+        </p:nvSpPr>
+        <p:spPr>
+          <a:xfrm>
+            <a:off x="3052153" y="6768030"/>
+            <a:ext cx="3429000" cy="646331"/>
+          </a:xfrm>
+          <a:prstGeom prst="rect">
+            <a:avLst/>
+          </a:prstGeom>
+        </p:spPr>
+        <p:txBody>
+          <a:bodyPr>
+            <a:spAutoFit/>
+          </a:bodyPr>
+          <a:lstStyle/>
+          <a:p>
+            <a:r>
+              <a:rPr lang="en-US" dirty="0"/>
+              <a:t>With CART, everything that is said is "captioned" live for deaf and hard of hearing clients. In fact, it can be thought of as captioning for non-broadcast settings, such as classrooms, churches, meetings, and conferences.</a:t>
+            </a:r>
+          </a:p>
+        </p:txBody>
+      </p:sp>
+      <p:sp>
+        <p:nvSpPr>
+          <p:cNvPr id="94" name="Rectangle 93"/>
+          <p:cNvSpPr/>
+          <p:nvPr/>
+        </p:nvSpPr>
+        <p:spPr>
+          <a:xfrm>
+            <a:off x="3052153" y="5276269"/>
+            <a:ext cx="3429000" cy="923330"/>
+          </a:xfrm>
+          <a:prstGeom prst="rect">
+            <a:avLst/>
+          </a:prstGeom>
+        </p:spPr>
+        <p:txBody>
+          <a:bodyPr>
+            <a:spAutoFit/>
+          </a:bodyPr>
+          <a:lstStyle/>
+          <a:p>
+            <a:r>
+              <a:rPr lang="en-US" dirty="0"/>
+              <a:t>Roger Pen transmits the speaker's voice directly into your ears. Cutting Edge Wireless microphone. Roger Pen features adaptive wireless transmission, fully automated settings, wideband audio Bluetooth for cell phone use, TV connectivity, and an audio input for listening to multimedia. Swiss premium quality product developed by Phonak, the world's leading hearing healthcare company.</a:t>
+            </a:r>
+          </a:p>
+        </p:txBody>
+      </p:sp>
+      <p:sp>
+        <p:nvSpPr>
+          <p:cNvPr id="95" name="TextBox 94"/>
+          <p:cNvSpPr txBox="1"/>
+          <p:nvPr/>
+        </p:nvSpPr>
+        <p:spPr>
+          <a:xfrm>
+            <a:off x="458671" y="4183436"/>
+            <a:ext cx="1582484" cy="523220"/>
+          </a:xfrm>
+          <a:prstGeom prst="rect">
+            <a:avLst/>
+          </a:prstGeom>
+          <a:noFill/>
+        </p:spPr>
+        <p:txBody>
+          <a:bodyPr wrap="none" rtlCol="0">
+            <a:spAutoFit/>
+          </a:bodyPr>
+          <a:lstStyle/>
+          <a:p>
+            <a:r>
+              <a:rPr lang="en-US" sz="2800" b="1" dirty="0" smtClean="0">
+                <a:latin typeface="Avenir Black"/>
+                <a:cs typeface="Avenir Black"/>
+              </a:rPr>
+              <a:t>Services </a:t>
+            </a:r>
+            <a:endParaRPr lang="en-US" sz="2800" b="1" dirty="0">
+              <a:latin typeface="Avenir Black"/>
+              <a:cs typeface="Avenir Black"/>
+            </a:endParaRPr>
+          </a:p>
+        </p:txBody>
+      </p:sp>
+      <p:sp>
+        <p:nvSpPr>
+          <p:cNvPr id="101" name="TextBox 100"/>
+          <p:cNvSpPr txBox="1"/>
+          <p:nvPr/>
+        </p:nvSpPr>
+        <p:spPr>
+          <a:xfrm>
+            <a:off x="294309" y="1389256"/>
+            <a:ext cx="6022482" cy="1384995"/>
+          </a:xfrm>
+          <a:prstGeom prst="rect">
+            <a:avLst/>
+          </a:prstGeom>
+          <a:noFill/>
+        </p:spPr>
+        <p:txBody>
+          <a:bodyPr wrap="square" rtlCol="0">
+            <a:spAutoFit/>
+          </a:bodyPr>
+          <a:lstStyle/>
+          <a:p>
+            <a:r>
+              <a:rPr lang="en-US" sz="2800" b="1" dirty="0">
+                <a:latin typeface="Avenir Black"/>
+                <a:cs typeface="Avenir Black"/>
+              </a:rPr>
+              <a:t>Sorry, this item is not available during the time you requested</a:t>
+            </a:r>
+            <a:r>
+              <a:rPr lang="en-US" sz="2800" b="1" dirty="0" smtClean="0">
+                <a:latin typeface="Avenir Black"/>
+                <a:cs typeface="Avenir Black"/>
+              </a:rPr>
+              <a:t>.</a:t>
+            </a:r>
+            <a:endParaRPr lang="en-US" sz="2800" b="1" dirty="0">
+              <a:latin typeface="Avenir Black"/>
+              <a:cs typeface="Avenir Black"/>
+            </a:endParaRPr>
+          </a:p>
+          <a:p>
+            <a:r>
+              <a:rPr lang="en-US" sz="2800" b="1" dirty="0">
+                <a:latin typeface="Avenir Black"/>
+                <a:cs typeface="Avenir Black"/>
+              </a:rPr>
+              <a:t>Try another date or item.   </a:t>
+            </a:r>
+          </a:p>
+        </p:txBody>
+      </p:sp>
+      <p:sp>
+        <p:nvSpPr>
+          <p:cNvPr id="6" name="Rectangle 5"/>
+          <p:cNvSpPr/>
+          <p:nvPr/>
+        </p:nvSpPr>
+        <p:spPr>
+          <a:xfrm>
+            <a:off x="1775374" y="3150242"/>
+            <a:ext cx="253362" cy="335155"/>
+          </a:xfrm>
+          <a:prstGeom prst="rect">
+            <a:avLst/>
+          </a:prstGeom>
+          <a:solidFill>
+            <a:schemeClr val="tx1"/>
+          </a:solidFill>
+          <a:ln>
+            <a:noFill/>
+          </a:ln>
+        </p:spPr>
+        <p:style>
+          <a:lnRef idx="1">
+            <a:schemeClr val="accent1"/>
+          </a:lnRef>
+          <a:fillRef idx="3">
+            <a:schemeClr val="accent1"/>
+          </a:fillRef>
+          <a:effectRef idx="2">
+            <a:schemeClr val="accent1"/>
+          </a:effectRef>
+          <a:fontRef idx="minor">
+            <a:schemeClr val="lt1"/>
+          </a:fontRef>
+        </p:style>
+        <p:txBody>
+          <a:bodyPr rtlCol="0" anchor="ctr"/>
+          <a:lstStyle/>
+          <a:p>
+            <a:pPr algn="ctr"/>
+            <a:endParaRPr lang="en-US"/>
+          </a:p>
+        </p:txBody>
+      </p:sp>
+      <p:sp>
+        <p:nvSpPr>
+          <p:cNvPr id="39" name="Rectangle 38"/>
+          <p:cNvSpPr/>
+          <p:nvPr/>
+        </p:nvSpPr>
+        <p:spPr>
+          <a:xfrm>
+            <a:off x="3345439" y="3150242"/>
+            <a:ext cx="253362" cy="335155"/>
+          </a:xfrm>
+          <a:prstGeom prst="rect">
+            <a:avLst/>
+          </a:prstGeom>
+          <a:solidFill>
+            <a:schemeClr val="tx1"/>
+          </a:solidFill>
+          <a:ln>
+            <a:noFill/>
+          </a:ln>
+        </p:spPr>
+        <p:style>
+          <a:lnRef idx="1">
+            <a:schemeClr val="accent1"/>
+          </a:lnRef>
+          <a:fillRef idx="3">
+            <a:schemeClr val="accent1"/>
+          </a:fillRef>
+          <a:effectRef idx="2">
+            <a:schemeClr val="accent1"/>
+          </a:effectRef>
+          <a:fontRef idx="minor">
+            <a:schemeClr val="lt1"/>
+          </a:fontRef>
+        </p:style>
+        <p:txBody>
+          <a:bodyPr rtlCol="0" anchor="ctr"/>
+          <a:lstStyle/>
+          <a:p>
+            <a:pPr algn="ctr"/>
+            <a:endParaRPr lang="en-US"/>
+          </a:p>
+        </p:txBody>
+      </p:sp>
+      <p:sp>
+        <p:nvSpPr>
+          <p:cNvPr id="40" name="Rectangle 39"/>
+          <p:cNvSpPr/>
+          <p:nvPr/>
+        </p:nvSpPr>
+        <p:spPr>
+          <a:xfrm>
+            <a:off x="4915505" y="3150242"/>
+            <a:ext cx="253362" cy="335155"/>
+          </a:xfrm>
+          <a:prstGeom prst="rect">
+            <a:avLst/>
+          </a:prstGeom>
+          <a:solidFill>
+            <a:schemeClr val="tx1"/>
+          </a:solidFill>
+          <a:ln>
+            <a:noFill/>
+          </a:ln>
+        </p:spPr>
+        <p:style>
+          <a:lnRef idx="1">
+            <a:schemeClr val="accent1"/>
+          </a:lnRef>
+          <a:fillRef idx="3">
+            <a:schemeClr val="accent1"/>
+          </a:fillRef>
+          <a:effectRef idx="2">
+            <a:schemeClr val="accent1"/>
+          </a:effectRef>
+          <a:fontRef idx="minor">
+            <a:schemeClr val="lt1"/>
+          </a:fontRef>
+        </p:style>
+        <p:txBody>
+          <a:bodyPr rtlCol="0" anchor="ctr"/>
+          <a:lstStyle/>
+          <a:p>
+            <a:pPr algn="ctr"/>
+            <a:endParaRPr lang="en-US"/>
+          </a:p>
+        </p:txBody>
+      </p:sp>
+      <p:sp>
+        <p:nvSpPr>
+          <p:cNvPr id="42" name="Right Triangle 41"/>
+          <p:cNvSpPr/>
+          <p:nvPr/>
+        </p:nvSpPr>
+        <p:spPr>
+          <a:xfrm rot="13432509">
+            <a:off x="1779446" y="3237218"/>
+            <a:ext cx="185682" cy="185682"/>
+          </a:xfrm>
+          <a:prstGeom prst="rtTriangle">
+            <a:avLst/>
+          </a:prstGeom>
+          <a:solidFill>
+            <a:schemeClr val="bg1">
+              <a:lumMod val="95000"/>
+            </a:schemeClr>
+          </a:solidFill>
+          <a:ln>
+            <a:solidFill>
+              <a:schemeClr val="bg1">
+                <a:lumMod val="50000"/>
+              </a:schemeClr>
+            </a:solidFill>
+          </a:ln>
+        </p:spPr>
+        <p:style>
+          <a:lnRef idx="1">
+            <a:schemeClr val="accent1"/>
+          </a:lnRef>
+          <a:fillRef idx="3">
+            <a:schemeClr val="accent1"/>
+          </a:fillRef>
+          <a:effectRef idx="2">
+            <a:schemeClr val="accent1"/>
+          </a:effectRef>
+          <a:fontRef idx="minor">
+            <a:schemeClr val="lt1"/>
+          </a:fontRef>
+        </p:style>
+        <p:txBody>
+          <a:bodyPr rtlCol="0" anchor="ctr"/>
+          <a:lstStyle/>
+          <a:p>
+            <a:pPr algn="ctr"/>
+            <a:endParaRPr lang="en-US"/>
+          </a:p>
+        </p:txBody>
+      </p:sp>
+      <p:sp>
+        <p:nvSpPr>
+          <p:cNvPr id="43" name="Right Triangle 42"/>
+          <p:cNvSpPr/>
+          <p:nvPr/>
+        </p:nvSpPr>
+        <p:spPr>
+          <a:xfrm rot="13432509">
+            <a:off x="3343981" y="3237218"/>
+            <a:ext cx="185682" cy="185682"/>
+          </a:xfrm>
+          <a:prstGeom prst="rtTriangle">
+            <a:avLst/>
+          </a:prstGeom>
+          <a:solidFill>
+            <a:schemeClr val="bg1">
+              <a:lumMod val="95000"/>
+            </a:schemeClr>
+          </a:solidFill>
+          <a:ln>
+            <a:solidFill>
+              <a:schemeClr val="bg1">
+                <a:lumMod val="50000"/>
+              </a:schemeClr>
+            </a:solidFill>
+          </a:ln>
+        </p:spPr>
+        <p:style>
+          <a:lnRef idx="1">
+            <a:schemeClr val="accent1"/>
+          </a:lnRef>
+          <a:fillRef idx="3">
+            <a:schemeClr val="accent1"/>
+          </a:fillRef>
+          <a:effectRef idx="2">
+            <a:schemeClr val="accent1"/>
+          </a:effectRef>
+          <a:fontRef idx="minor">
+            <a:schemeClr val="lt1"/>
+          </a:fontRef>
+        </p:style>
+        <p:txBody>
+          <a:bodyPr rtlCol="0" anchor="ctr"/>
+          <a:lstStyle/>
+          <a:p>
+            <a:pPr algn="ctr"/>
+            <a:endParaRPr lang="en-US"/>
+          </a:p>
+        </p:txBody>
+      </p:sp>
+      <p:sp>
+        <p:nvSpPr>
+          <p:cNvPr id="44" name="Right Triangle 43"/>
+          <p:cNvSpPr/>
+          <p:nvPr/>
+        </p:nvSpPr>
+        <p:spPr>
+          <a:xfrm rot="13432509">
+            <a:off x="4919427" y="3237219"/>
+            <a:ext cx="185682" cy="185682"/>
+          </a:xfrm>
+          <a:prstGeom prst="rtTriangle">
+            <a:avLst/>
+          </a:prstGeom>
+          <a:solidFill>
+            <a:schemeClr val="bg1">
+              <a:lumMod val="95000"/>
+            </a:schemeClr>
+          </a:solidFill>
+          <a:ln>
+            <a:solidFill>
+              <a:schemeClr val="bg1">
+                <a:lumMod val="50000"/>
+              </a:schemeClr>
+            </a:solidFill>
+          </a:ln>
+        </p:spPr>
+        <p:style>
+          <a:lnRef idx="1">
+            <a:schemeClr val="accent1"/>
+          </a:lnRef>
+          <a:fillRef idx="3">
+            <a:schemeClr val="accent1"/>
+          </a:fillRef>
+          <a:effectRef idx="2">
+            <a:schemeClr val="accent1"/>
+          </a:effectRef>
+          <a:fontRef idx="minor">
+            <a:schemeClr val="lt1"/>
+          </a:fontRef>
+        </p:style>
+        <p:txBody>
+          <a:bodyPr rtlCol="0" anchor="ctr"/>
+          <a:lstStyle/>
+          <a:p>
+            <a:pPr algn="ctr"/>
+            <a:endParaRPr lang="en-US"/>
+          </a:p>
+        </p:txBody>
+      </p:sp>
+      <p:pic>
+        <p:nvPicPr>
+          <p:cNvPr id="7" name="Picture 6" descr="Screen Shot 2016-10-17 at 4.28.13 PM.png"/>
+          <p:cNvPicPr>
+            <a:picLocks noChangeAspect="1"/>
+          </p:cNvPicPr>
+          <p:nvPr/>
+        </p:nvPicPr>
+        <p:blipFill>
+          <a:blip r:embed="rId3">
+            <a:alphaModFix amt="65000"/>
+            <a:extLst>
+              <a:ext uri="{28A0092B-C50C-407E-A947-70E740481C1C}">
+                <a14:useLocalDpi xmlns:a14="http://schemas.microsoft.com/office/drawing/2010/main" val="0"/>
+              </a:ext>
+            </a:extLst>
+          </a:blip>
+          <a:stretch>
+            <a:fillRect/>
+          </a:stretch>
+        </p:blipFill>
+        <p:spPr>
+          <a:xfrm>
+            <a:off x="458671" y="4926418"/>
+            <a:ext cx="2205144" cy="1135872"/>
+          </a:xfrm>
+          <a:prstGeom prst="rect">
+            <a:avLst/>
+          </a:prstGeom>
+        </p:spPr>
+      </p:pic>
+      <p:pic>
+        <p:nvPicPr>
+          <p:cNvPr id="2" name="Picture 1"/>
+          <p:cNvPicPr>
+            <a:picLocks noChangeAspect="1"/>
+          </p:cNvPicPr>
+          <p:nvPr/>
+        </p:nvPicPr>
+        <p:blipFill>
+          <a:blip r:embed="rId4">
+            <a:alphaModFix amt="60000"/>
+          </a:blip>
+          <a:stretch>
+            <a:fillRect/>
+          </a:stretch>
+        </p:blipFill>
+        <p:spPr>
+          <a:xfrm>
+            <a:off x="458671" y="6438269"/>
+            <a:ext cx="2205143" cy="1114592"/>
+          </a:xfrm>
+          <a:prstGeom prst="rect">
+            <a:avLst/>
+          </a:prstGeom>
+        </p:spPr>
+      </p:pic>
+    </p:spTree>
+    <p:extLst>
+      <p:ext uri="{BB962C8B-B14F-4D97-AF65-F5344CB8AC3E}">
+        <p14:creationId xmlns:p14="http://schemas.microsoft.com/office/powerpoint/2010/main" val="883408471"/>
+      </p:ext>
+    </p:extLst>
+  </p:cSld>
+  <p:clrMapOvr>
+    <a:masterClrMapping/>
+  </p:clrMapOvr>
+  <p:timing>
+    <p:tnLst>
+      <p:par>
+        <p:cTn xmlns:p14="http://schemas.microsoft.com/office/powerpoint/2010/main" id="1" dur="indefinite" restart="never" nodeType="tmRoot"/>
+      </p:par>
+    </p:tnLst>
+  </p:timing>
+</p:sld>
+</file>
+
+<file path=ppt/slides/slide8.xml><?xml version="1.0" encoding="utf-8"?>
+<p:sld xmlns:a="http://schemas.openxmlformats.org/drawingml/2006/main" xmlns:r="http://schemas.openxmlformats.org/officeDocument/2006/relationships" xmlns:p="http://schemas.openxmlformats.org/presentationml/2006/main">
+  <p:cSld>
+    <p:spTree>
+      <p:nvGrpSpPr>
+        <p:cNvPr id="1" name=""/>
+        <p:cNvGrpSpPr/>
+        <p:nvPr/>
+      </p:nvGrpSpPr>
+      <p:grpSpPr>
+        <a:xfrm>
+          <a:off x="0" y="0"/>
+          <a:ext cx="0" cy="0"/>
+          <a:chOff x="0" y="0"/>
+          <a:chExt cx="0" cy="0"/>
+        </a:xfrm>
+      </p:grpSpPr>
+      <p:sp>
+        <p:nvSpPr>
+          <p:cNvPr id="95" name="TextBox 94"/>
+          <p:cNvSpPr txBox="1"/>
+          <p:nvPr/>
+        </p:nvSpPr>
+        <p:spPr>
+          <a:xfrm>
+            <a:off x="458671" y="1643436"/>
+            <a:ext cx="1338828" cy="523220"/>
+          </a:xfrm>
+          <a:prstGeom prst="rect">
+            <a:avLst/>
+          </a:prstGeom>
+          <a:noFill/>
+        </p:spPr>
+        <p:txBody>
+          <a:bodyPr wrap="none" rtlCol="0">
+            <a:spAutoFit/>
+          </a:bodyPr>
+          <a:lstStyle/>
+          <a:p>
+            <a:r>
+              <a:rPr lang="en-US" sz="2800" b="1" dirty="0" smtClean="0">
+                <a:latin typeface="Avenir Black"/>
+                <a:cs typeface="Avenir Black"/>
+              </a:rPr>
+              <a:t>Sign In </a:t>
+            </a:r>
+            <a:endParaRPr lang="en-US" sz="2800" b="1" dirty="0">
+              <a:latin typeface="Avenir Black"/>
+              <a:cs typeface="Avenir Black"/>
+            </a:endParaRPr>
+          </a:p>
+        </p:txBody>
+      </p:sp>
+      <p:sp>
+        <p:nvSpPr>
+          <p:cNvPr id="12" name="Rectangle 11"/>
+          <p:cNvSpPr/>
+          <p:nvPr/>
+        </p:nvSpPr>
+        <p:spPr>
+          <a:xfrm>
+            <a:off x="458671" y="2417822"/>
+            <a:ext cx="3633551" cy="347956"/>
+          </a:xfrm>
+          <a:prstGeom prst="rect">
+            <a:avLst/>
+          </a:prstGeom>
+          <a:solidFill>
+            <a:schemeClr val="bg1"/>
+          </a:solidFill>
+          <a:ln>
+            <a:solidFill>
+              <a:srgbClr val="7F7F7F"/>
+            </a:solidFill>
+          </a:ln>
+        </p:spPr>
+        <p:style>
+          <a:lnRef idx="1">
+            <a:schemeClr val="accent1"/>
+          </a:lnRef>
+          <a:fillRef idx="3">
+            <a:schemeClr val="accent1"/>
+          </a:fillRef>
+          <a:effectRef idx="2">
+            <a:schemeClr val="accent1"/>
+          </a:effectRef>
+          <a:fontRef idx="minor">
+            <a:schemeClr val="lt1"/>
+          </a:fontRef>
+        </p:style>
+        <p:txBody>
+          <a:bodyPr rtlCol="0" anchor="ctr"/>
+          <a:lstStyle/>
+          <a:p>
+            <a:r>
+              <a:rPr lang="en-US" sz="1600" dirty="0" smtClean="0">
+                <a:solidFill>
+                  <a:srgbClr val="000000"/>
+                </a:solidFill>
+              </a:rPr>
+              <a:t>Email </a:t>
+            </a:r>
+            <a:endParaRPr lang="en-US" sz="1600" dirty="0">
+              <a:solidFill>
+                <a:srgbClr val="000000"/>
+              </a:solidFill>
+            </a:endParaRPr>
+          </a:p>
+        </p:txBody>
+      </p:sp>
+      <p:sp>
+        <p:nvSpPr>
+          <p:cNvPr id="13" name="Rectangle 12"/>
+          <p:cNvSpPr/>
+          <p:nvPr/>
+        </p:nvSpPr>
+        <p:spPr>
+          <a:xfrm>
+            <a:off x="458671" y="2918178"/>
+            <a:ext cx="3633551" cy="347956"/>
+          </a:xfrm>
+          <a:prstGeom prst="rect">
+            <a:avLst/>
+          </a:prstGeom>
+          <a:solidFill>
+            <a:schemeClr val="bg1"/>
+          </a:solidFill>
+          <a:ln>
+            <a:solidFill>
+              <a:srgbClr val="7F7F7F"/>
+            </a:solidFill>
+          </a:ln>
+        </p:spPr>
+        <p:style>
+          <a:lnRef idx="1">
+            <a:schemeClr val="accent1"/>
+          </a:lnRef>
+          <a:fillRef idx="3">
+            <a:schemeClr val="accent1"/>
+          </a:fillRef>
+          <a:effectRef idx="2">
+            <a:schemeClr val="accent1"/>
+          </a:effectRef>
+          <a:fontRef idx="minor">
+            <a:schemeClr val="lt1"/>
+          </a:fontRef>
+        </p:style>
+        <p:txBody>
+          <a:bodyPr rtlCol="0" anchor="ctr"/>
+          <a:lstStyle/>
+          <a:p>
+            <a:r>
+              <a:rPr lang="en-US" sz="1600" dirty="0" smtClean="0">
+                <a:solidFill>
+                  <a:srgbClr val="000000"/>
+                </a:solidFill>
+              </a:rPr>
+              <a:t>Password </a:t>
+            </a:r>
+            <a:endParaRPr lang="en-US" sz="1600" dirty="0">
+              <a:solidFill>
+                <a:srgbClr val="000000"/>
+              </a:solidFill>
+            </a:endParaRPr>
+          </a:p>
+        </p:txBody>
+      </p:sp>
+      <p:sp>
+        <p:nvSpPr>
+          <p:cNvPr id="14" name="Rectangle 13"/>
+          <p:cNvSpPr/>
+          <p:nvPr/>
+        </p:nvSpPr>
+        <p:spPr>
+          <a:xfrm>
+            <a:off x="458671" y="3422179"/>
+            <a:ext cx="3633551" cy="347956"/>
+          </a:xfrm>
+          <a:prstGeom prst="rect">
+            <a:avLst/>
+          </a:prstGeom>
+          <a:solidFill>
+            <a:schemeClr val="bg1">
+              <a:lumMod val="85000"/>
+            </a:schemeClr>
+          </a:solidFill>
+          <a:ln>
+            <a:solidFill>
+              <a:srgbClr val="7F7F7F"/>
+            </a:solidFill>
+          </a:ln>
+        </p:spPr>
+        <p:style>
+          <a:lnRef idx="1">
+            <a:schemeClr val="accent1"/>
+          </a:lnRef>
+          <a:fillRef idx="3">
+            <a:schemeClr val="accent1"/>
+          </a:fillRef>
+          <a:effectRef idx="2">
+            <a:schemeClr val="accent1"/>
+          </a:effectRef>
+          <a:fontRef idx="minor">
+            <a:schemeClr val="lt1"/>
+          </a:fontRef>
+        </p:style>
+        <p:txBody>
+          <a:bodyPr rtlCol="0" anchor="ctr"/>
+          <a:lstStyle/>
+          <a:p>
+            <a:r>
+              <a:rPr lang="en-US" sz="1600" dirty="0" smtClean="0">
+                <a:solidFill>
+                  <a:srgbClr val="000000"/>
+                </a:solidFill>
+              </a:rPr>
+              <a:t>Sign In </a:t>
+            </a:r>
+            <a:endParaRPr lang="en-US" sz="1600" dirty="0">
+              <a:solidFill>
+                <a:srgbClr val="000000"/>
+              </a:solidFill>
+            </a:endParaRPr>
+          </a:p>
+        </p:txBody>
+      </p:sp>
+      <p:sp>
+        <p:nvSpPr>
+          <p:cNvPr id="21" name="TextBox 20"/>
+          <p:cNvSpPr txBox="1"/>
+          <p:nvPr/>
+        </p:nvSpPr>
+        <p:spPr>
+          <a:xfrm>
+            <a:off x="4646850" y="1643436"/>
+            <a:ext cx="1633781" cy="523220"/>
+          </a:xfrm>
+          <a:prstGeom prst="rect">
+            <a:avLst/>
+          </a:prstGeom>
+          <a:solidFill>
+            <a:srgbClr val="D9D9D9"/>
+          </a:solidFill>
+        </p:spPr>
+        <p:txBody>
+          <a:bodyPr wrap="none" rtlCol="0">
+            <a:spAutoFit/>
+          </a:bodyPr>
+          <a:lstStyle/>
+          <a:p>
+            <a:r>
+              <a:rPr lang="en-US" sz="2800" b="1" dirty="0" smtClean="0">
+                <a:latin typeface="Avenir Black"/>
+                <a:cs typeface="Avenir Black"/>
+              </a:rPr>
+              <a:t>Register</a:t>
+            </a:r>
+            <a:endParaRPr lang="en-US" sz="2800" b="1" dirty="0">
+              <a:latin typeface="Avenir Black"/>
+              <a:cs typeface="Avenir Black"/>
+            </a:endParaRPr>
+          </a:p>
+        </p:txBody>
+      </p:sp>
+      <p:pic>
+        <p:nvPicPr>
+          <p:cNvPr id="10" name="Picture 9" descr="Screen Shot 2016-10-17 at 6.20.27 PM.png"/>
+          <p:cNvPicPr>
+            <a:picLocks noChangeAspect="1"/>
+          </p:cNvPicPr>
+          <p:nvPr/>
+        </p:nvPicPr>
+        <p:blipFill>
+          <a:blip r:embed="rId2">
+            <a:extLst>
+              <a:ext uri="{28A0092B-C50C-407E-A947-70E740481C1C}">
+                <a14:useLocalDpi xmlns:a14="http://schemas.microsoft.com/office/drawing/2010/main" val="0"/>
+              </a:ext>
+            </a:extLst>
+          </a:blip>
+          <a:stretch>
+            <a:fillRect/>
+          </a:stretch>
+        </p:blipFill>
+        <p:spPr>
+          <a:xfrm>
+            <a:off x="0" y="-470441"/>
+            <a:ext cx="6905034" cy="1666875"/>
+          </a:xfrm>
+          <a:prstGeom prst="rect">
+            <a:avLst/>
+          </a:prstGeom>
+        </p:spPr>
+      </p:pic>
+    </p:spTree>
+    <p:extLst>
+      <p:ext uri="{BB962C8B-B14F-4D97-AF65-F5344CB8AC3E}">
+        <p14:creationId xmlns:p14="http://schemas.microsoft.com/office/powerpoint/2010/main" val="4195558641"/>
+      </p:ext>
+    </p:extLst>
+  </p:cSld>
+  <p:clrMapOvr>
+    <a:masterClrMapping/>
+  </p:clrMapOvr>
+</p:sld>
+</file>
+
+<file path=ppt/slides/slide9.xml><?xml version="1.0" encoding="utf-8"?>
+<p:sld xmlns:a="http://schemas.openxmlformats.org/drawingml/2006/main" xmlns:r="http://schemas.openxmlformats.org/officeDocument/2006/relationships" xmlns:p="http://schemas.openxmlformats.org/presentationml/2006/main">
+  <p:cSld>
+    <p:spTree>
+      <p:nvGrpSpPr>
+        <p:cNvPr id="1" name=""/>
+        <p:cNvGrpSpPr/>
+        <p:nvPr/>
+      </p:nvGrpSpPr>
+      <p:grpSpPr>
+        <a:xfrm>
+          <a:off x="0" y="0"/>
+          <a:ext cx="0" cy="0"/>
+          <a:chOff x="0" y="0"/>
+          <a:chExt cx="0" cy="0"/>
+        </a:xfrm>
+      </p:grpSpPr>
+      <p:sp>
+        <p:nvSpPr>
+          <p:cNvPr id="95" name="TextBox 94"/>
+          <p:cNvSpPr txBox="1"/>
+          <p:nvPr/>
+        </p:nvSpPr>
+        <p:spPr>
+          <a:xfrm>
+            <a:off x="458671" y="1643436"/>
+            <a:ext cx="1633781" cy="523220"/>
+          </a:xfrm>
+          <a:prstGeom prst="rect">
+            <a:avLst/>
+          </a:prstGeom>
+          <a:noFill/>
+        </p:spPr>
+        <p:txBody>
+          <a:bodyPr wrap="none" rtlCol="0">
+            <a:spAutoFit/>
+          </a:bodyPr>
+          <a:lstStyle/>
+          <a:p>
+            <a:r>
+              <a:rPr lang="en-US" sz="2800" b="1" dirty="0" smtClean="0">
+                <a:latin typeface="Avenir Black"/>
+                <a:cs typeface="Avenir Black"/>
+              </a:rPr>
+              <a:t>Register</a:t>
+            </a:r>
+            <a:endParaRPr lang="en-US" sz="2800" b="1" dirty="0">
+              <a:latin typeface="Avenir Black"/>
+              <a:cs typeface="Avenir Black"/>
+            </a:endParaRPr>
+          </a:p>
+        </p:txBody>
+      </p:sp>
+      <p:sp>
+        <p:nvSpPr>
+          <p:cNvPr id="12" name="Rectangle 11"/>
+          <p:cNvSpPr/>
+          <p:nvPr/>
+        </p:nvSpPr>
+        <p:spPr>
+          <a:xfrm>
+            <a:off x="458671" y="2417822"/>
+            <a:ext cx="3633551" cy="347956"/>
+          </a:xfrm>
+          <a:prstGeom prst="rect">
+            <a:avLst/>
+          </a:prstGeom>
+          <a:solidFill>
+            <a:schemeClr val="bg1"/>
+          </a:solidFill>
+          <a:ln>
+            <a:solidFill>
+              <a:srgbClr val="7F7F7F"/>
+            </a:solidFill>
+          </a:ln>
+        </p:spPr>
+        <p:style>
+          <a:lnRef idx="1">
+            <a:schemeClr val="accent1"/>
+          </a:lnRef>
+          <a:fillRef idx="3">
+            <a:schemeClr val="accent1"/>
+          </a:fillRef>
+          <a:effectRef idx="2">
+            <a:schemeClr val="accent1"/>
+          </a:effectRef>
+          <a:fontRef idx="minor">
+            <a:schemeClr val="lt1"/>
+          </a:fontRef>
+        </p:style>
+        <p:txBody>
+          <a:bodyPr rtlCol="0" anchor="ctr"/>
+          <a:lstStyle/>
+          <a:p>
+            <a:r>
+              <a:rPr lang="en-US" sz="1600" dirty="0" smtClean="0">
+                <a:solidFill>
+                  <a:srgbClr val="000000"/>
+                </a:solidFill>
+              </a:rPr>
+              <a:t>Email </a:t>
+            </a:r>
+            <a:endParaRPr lang="en-US" sz="1600" dirty="0">
+              <a:solidFill>
+                <a:srgbClr val="000000"/>
+              </a:solidFill>
+            </a:endParaRPr>
+          </a:p>
+        </p:txBody>
+      </p:sp>
+      <p:sp>
+        <p:nvSpPr>
+          <p:cNvPr id="13" name="Rectangle 12"/>
+          <p:cNvSpPr/>
+          <p:nvPr/>
+        </p:nvSpPr>
+        <p:spPr>
+          <a:xfrm>
+            <a:off x="458671" y="2918178"/>
+            <a:ext cx="3633551" cy="347956"/>
+          </a:xfrm>
+          <a:prstGeom prst="rect">
+            <a:avLst/>
+          </a:prstGeom>
+          <a:solidFill>
+            <a:schemeClr val="bg1"/>
+          </a:solidFill>
+          <a:ln>
+            <a:solidFill>
+              <a:srgbClr val="7F7F7F"/>
+            </a:solidFill>
+          </a:ln>
+        </p:spPr>
+        <p:style>
+          <a:lnRef idx="1">
+            <a:schemeClr val="accent1"/>
+          </a:lnRef>
+          <a:fillRef idx="3">
+            <a:schemeClr val="accent1"/>
+          </a:fillRef>
+          <a:effectRef idx="2">
+            <a:schemeClr val="accent1"/>
+          </a:effectRef>
+          <a:fontRef idx="minor">
+            <a:schemeClr val="lt1"/>
+          </a:fontRef>
+        </p:style>
+        <p:txBody>
+          <a:bodyPr rtlCol="0" anchor="ctr"/>
+          <a:lstStyle/>
+          <a:p>
+            <a:r>
+              <a:rPr lang="en-US" sz="1600" dirty="0" smtClean="0">
+                <a:solidFill>
+                  <a:srgbClr val="000000"/>
+                </a:solidFill>
+              </a:rPr>
+              <a:t>Password </a:t>
+            </a:r>
+            <a:endParaRPr lang="en-US" sz="1600" dirty="0">
+              <a:solidFill>
+                <a:srgbClr val="000000"/>
+              </a:solidFill>
+            </a:endParaRPr>
+          </a:p>
+        </p:txBody>
+      </p:sp>
+      <p:sp>
+        <p:nvSpPr>
+          <p:cNvPr id="14" name="Rectangle 13"/>
+          <p:cNvSpPr/>
+          <p:nvPr/>
+        </p:nvSpPr>
+        <p:spPr>
+          <a:xfrm>
+            <a:off x="458671" y="6209603"/>
+            <a:ext cx="3633551" cy="347956"/>
+          </a:xfrm>
+          <a:prstGeom prst="rect">
+            <a:avLst/>
+          </a:prstGeom>
+          <a:solidFill>
+            <a:schemeClr val="bg1">
+              <a:lumMod val="85000"/>
+            </a:schemeClr>
+          </a:solidFill>
+          <a:ln>
+            <a:solidFill>
+              <a:srgbClr val="7F7F7F"/>
+            </a:solidFill>
+          </a:ln>
+        </p:spPr>
+        <p:style>
+          <a:lnRef idx="1">
+            <a:schemeClr val="accent1"/>
+          </a:lnRef>
+          <a:fillRef idx="3">
+            <a:schemeClr val="accent1"/>
+          </a:fillRef>
+          <a:effectRef idx="2">
+            <a:schemeClr val="accent1"/>
+          </a:effectRef>
+          <a:fontRef idx="minor">
+            <a:schemeClr val="lt1"/>
+          </a:fontRef>
+        </p:style>
+        <p:txBody>
+          <a:bodyPr rtlCol="0" anchor="ctr"/>
+          <a:lstStyle/>
+          <a:p>
+            <a:r>
+              <a:rPr lang="en-US" sz="1600" dirty="0" smtClean="0">
+                <a:solidFill>
+                  <a:srgbClr val="000000"/>
+                </a:solidFill>
+              </a:rPr>
+              <a:t>Sign In Register </a:t>
+            </a:r>
+            <a:endParaRPr lang="en-US" sz="1600" dirty="0">
+              <a:solidFill>
+                <a:srgbClr val="000000"/>
+              </a:solidFill>
+            </a:endParaRPr>
+          </a:p>
+        </p:txBody>
+      </p:sp>
+      <p:sp>
+        <p:nvSpPr>
+          <p:cNvPr id="21" name="TextBox 20"/>
+          <p:cNvSpPr txBox="1"/>
+          <p:nvPr/>
+        </p:nvSpPr>
+        <p:spPr>
+          <a:xfrm>
+            <a:off x="4646850" y="1643436"/>
+            <a:ext cx="1338828" cy="523220"/>
+          </a:xfrm>
+          <a:prstGeom prst="rect">
+            <a:avLst/>
+          </a:prstGeom>
+          <a:solidFill>
+            <a:srgbClr val="D9D9D9"/>
+          </a:solidFill>
+        </p:spPr>
+        <p:txBody>
+          <a:bodyPr wrap="none" rtlCol="0">
+            <a:spAutoFit/>
+          </a:bodyPr>
+          <a:lstStyle/>
+          <a:p>
+            <a:r>
+              <a:rPr lang="en-US" sz="2800" b="1" dirty="0" smtClean="0">
+                <a:latin typeface="Avenir Black"/>
+                <a:cs typeface="Avenir Black"/>
+              </a:rPr>
+              <a:t>Sign In </a:t>
+            </a:r>
+            <a:endParaRPr lang="en-US" sz="2800" b="1" dirty="0">
+              <a:latin typeface="Avenir Black"/>
+              <a:cs typeface="Avenir Black"/>
+            </a:endParaRPr>
+          </a:p>
+        </p:txBody>
+      </p:sp>
+      <p:sp>
+        <p:nvSpPr>
+          <p:cNvPr id="11" name="Rectangle 10"/>
+          <p:cNvSpPr/>
+          <p:nvPr/>
+        </p:nvSpPr>
+        <p:spPr>
+          <a:xfrm>
+            <a:off x="458671" y="3425180"/>
+            <a:ext cx="3633551" cy="347956"/>
+          </a:xfrm>
+          <a:prstGeom prst="rect">
+            <a:avLst/>
+          </a:prstGeom>
+          <a:solidFill>
+            <a:schemeClr val="bg1"/>
+          </a:solidFill>
+          <a:ln>
+            <a:solidFill>
+              <a:srgbClr val="7F7F7F"/>
+            </a:solidFill>
+          </a:ln>
+        </p:spPr>
+        <p:style>
+          <a:lnRef idx="1">
+            <a:schemeClr val="accent1"/>
+          </a:lnRef>
+          <a:fillRef idx="3">
+            <a:schemeClr val="accent1"/>
+          </a:fillRef>
+          <a:effectRef idx="2">
+            <a:schemeClr val="accent1"/>
+          </a:effectRef>
+          <a:fontRef idx="minor">
+            <a:schemeClr val="lt1"/>
+          </a:fontRef>
+        </p:style>
+        <p:txBody>
+          <a:bodyPr rtlCol="0" anchor="ctr"/>
+          <a:lstStyle/>
+          <a:p>
+            <a:r>
+              <a:rPr lang="en-US" sz="1600" dirty="0" smtClean="0">
+                <a:solidFill>
+                  <a:srgbClr val="000000"/>
+                </a:solidFill>
+              </a:rPr>
+              <a:t>First Name </a:t>
+            </a:r>
+            <a:endParaRPr lang="en-US" sz="1600" dirty="0">
+              <a:solidFill>
+                <a:srgbClr val="000000"/>
+              </a:solidFill>
+            </a:endParaRPr>
+          </a:p>
+        </p:txBody>
+      </p:sp>
+      <p:sp>
+        <p:nvSpPr>
+          <p:cNvPr id="15" name="Rectangle 14"/>
+          <p:cNvSpPr/>
+          <p:nvPr/>
+        </p:nvSpPr>
+        <p:spPr>
+          <a:xfrm>
+            <a:off x="458671" y="3925536"/>
+            <a:ext cx="3633551" cy="347956"/>
+          </a:xfrm>
+          <a:prstGeom prst="rect">
+            <a:avLst/>
+          </a:prstGeom>
+          <a:solidFill>
+            <a:schemeClr val="bg1"/>
+          </a:solidFill>
+          <a:ln>
+            <a:solidFill>
+              <a:srgbClr val="7F7F7F"/>
+            </a:solidFill>
+          </a:ln>
+        </p:spPr>
+        <p:style>
+          <a:lnRef idx="1">
+            <a:schemeClr val="accent1"/>
+          </a:lnRef>
+          <a:fillRef idx="3">
+            <a:schemeClr val="accent1"/>
+          </a:fillRef>
+          <a:effectRef idx="2">
+            <a:schemeClr val="accent1"/>
+          </a:effectRef>
+          <a:fontRef idx="minor">
+            <a:schemeClr val="lt1"/>
+          </a:fontRef>
+        </p:style>
+        <p:txBody>
+          <a:bodyPr rtlCol="0" anchor="ctr"/>
+          <a:lstStyle/>
+          <a:p>
+            <a:r>
+              <a:rPr lang="en-US" sz="1600" dirty="0" smtClean="0">
+                <a:solidFill>
+                  <a:srgbClr val="000000"/>
+                </a:solidFill>
+              </a:rPr>
+              <a:t>Last Name </a:t>
+            </a:r>
+            <a:endParaRPr lang="en-US" sz="1600" dirty="0">
+              <a:solidFill>
+                <a:srgbClr val="000000"/>
+              </a:solidFill>
+            </a:endParaRPr>
+          </a:p>
+        </p:txBody>
+      </p:sp>
+      <p:sp>
+        <p:nvSpPr>
+          <p:cNvPr id="17" name="Rectangle 16"/>
+          <p:cNvSpPr/>
+          <p:nvPr/>
+        </p:nvSpPr>
+        <p:spPr>
+          <a:xfrm>
+            <a:off x="458671" y="4425892"/>
+            <a:ext cx="3633551" cy="347956"/>
+          </a:xfrm>
+          <a:prstGeom prst="rect">
+            <a:avLst/>
+          </a:prstGeom>
+          <a:solidFill>
+            <a:schemeClr val="bg1"/>
+          </a:solidFill>
+          <a:ln>
+            <a:solidFill>
+              <a:srgbClr val="7F7F7F"/>
+            </a:solidFill>
+          </a:ln>
+        </p:spPr>
+        <p:style>
+          <a:lnRef idx="1">
+            <a:schemeClr val="accent1"/>
+          </a:lnRef>
+          <a:fillRef idx="3">
+            <a:schemeClr val="accent1"/>
+          </a:fillRef>
+          <a:effectRef idx="2">
+            <a:schemeClr val="accent1"/>
+          </a:effectRef>
+          <a:fontRef idx="minor">
+            <a:schemeClr val="lt1"/>
+          </a:fontRef>
+        </p:style>
+        <p:txBody>
+          <a:bodyPr rtlCol="0" anchor="ctr"/>
+          <a:lstStyle/>
+          <a:p>
+            <a:r>
+              <a:rPr lang="en-US" sz="1600" dirty="0" smtClean="0">
+                <a:solidFill>
+                  <a:srgbClr val="000000"/>
+                </a:solidFill>
+              </a:rPr>
+              <a:t>Address</a:t>
+            </a:r>
+            <a:endParaRPr lang="en-US" sz="1600" dirty="0">
+              <a:solidFill>
+                <a:srgbClr val="000000"/>
+              </a:solidFill>
+            </a:endParaRPr>
+          </a:p>
+        </p:txBody>
+      </p:sp>
+      <p:sp>
+        <p:nvSpPr>
+          <p:cNvPr id="18" name="Rectangle 17"/>
+          <p:cNvSpPr/>
+          <p:nvPr/>
+        </p:nvSpPr>
+        <p:spPr>
+          <a:xfrm>
+            <a:off x="458671" y="4854421"/>
+            <a:ext cx="3633551" cy="347956"/>
+          </a:xfrm>
+          <a:prstGeom prst="rect">
+            <a:avLst/>
+          </a:prstGeom>
+          <a:solidFill>
+            <a:schemeClr val="bg1"/>
+          </a:solidFill>
+          <a:ln>
+            <a:solidFill>
+              <a:srgbClr val="7F7F7F"/>
+            </a:solidFill>
+          </a:ln>
+        </p:spPr>
+        <p:style>
+          <a:lnRef idx="1">
+            <a:schemeClr val="accent1"/>
+          </a:lnRef>
+          <a:fillRef idx="3">
+            <a:schemeClr val="accent1"/>
+          </a:fillRef>
+          <a:effectRef idx="2">
+            <a:schemeClr val="accent1"/>
+          </a:effectRef>
+          <a:fontRef idx="minor">
+            <a:schemeClr val="lt1"/>
+          </a:fontRef>
+        </p:style>
+        <p:txBody>
+          <a:bodyPr rtlCol="0" anchor="ctr"/>
+          <a:lstStyle/>
+          <a:p>
+            <a:r>
+              <a:rPr lang="en-US" sz="1600" dirty="0" smtClean="0">
+                <a:solidFill>
+                  <a:srgbClr val="000000"/>
+                </a:solidFill>
+              </a:rPr>
+              <a:t>City </a:t>
+            </a:r>
+            <a:endParaRPr lang="en-US" sz="1600" dirty="0">
+              <a:solidFill>
+                <a:srgbClr val="000000"/>
+              </a:solidFill>
+            </a:endParaRPr>
+          </a:p>
+        </p:txBody>
+      </p:sp>
+      <p:sp>
+        <p:nvSpPr>
+          <p:cNvPr id="19" name="Rectangle 18"/>
+          <p:cNvSpPr/>
+          <p:nvPr/>
+        </p:nvSpPr>
+        <p:spPr>
+          <a:xfrm>
+            <a:off x="458671" y="5290784"/>
+            <a:ext cx="3633551" cy="347956"/>
+          </a:xfrm>
+          <a:prstGeom prst="rect">
+            <a:avLst/>
+          </a:prstGeom>
+          <a:solidFill>
+            <a:schemeClr val="bg1"/>
+          </a:solidFill>
+          <a:ln>
+            <a:solidFill>
+              <a:srgbClr val="7F7F7F"/>
+            </a:solidFill>
+          </a:ln>
+        </p:spPr>
+        <p:style>
+          <a:lnRef idx="1">
+            <a:schemeClr val="accent1"/>
+          </a:lnRef>
+          <a:fillRef idx="3">
+            <a:schemeClr val="accent1"/>
+          </a:fillRef>
+          <a:effectRef idx="2">
+            <a:schemeClr val="accent1"/>
+          </a:effectRef>
+          <a:fontRef idx="minor">
+            <a:schemeClr val="lt1"/>
+          </a:fontRef>
+        </p:style>
+        <p:txBody>
+          <a:bodyPr rtlCol="0" anchor="ctr"/>
+          <a:lstStyle/>
+          <a:p>
+            <a:r>
+              <a:rPr lang="en-US" sz="1600" dirty="0" smtClean="0">
+                <a:solidFill>
+                  <a:srgbClr val="000000"/>
+                </a:solidFill>
+              </a:rPr>
+              <a:t>State </a:t>
+            </a:r>
+            <a:endParaRPr lang="en-US" sz="1600" dirty="0">
+              <a:solidFill>
+                <a:srgbClr val="000000"/>
+              </a:solidFill>
+            </a:endParaRPr>
+          </a:p>
+        </p:txBody>
+      </p:sp>
+      <p:sp>
+        <p:nvSpPr>
+          <p:cNvPr id="20" name="Rectangle 19"/>
+          <p:cNvSpPr/>
+          <p:nvPr/>
+        </p:nvSpPr>
+        <p:spPr>
+          <a:xfrm>
+            <a:off x="458671" y="5742734"/>
+            <a:ext cx="3633551" cy="347956"/>
+          </a:xfrm>
+          <a:prstGeom prst="rect">
+            <a:avLst/>
+          </a:prstGeom>
+          <a:solidFill>
+            <a:schemeClr val="bg1"/>
+          </a:solidFill>
+          <a:ln>
+            <a:solidFill>
+              <a:srgbClr val="7F7F7F"/>
+            </a:solidFill>
+          </a:ln>
+        </p:spPr>
+        <p:style>
+          <a:lnRef idx="1">
+            <a:schemeClr val="accent1"/>
+          </a:lnRef>
+          <a:fillRef idx="3">
+            <a:schemeClr val="accent1"/>
+          </a:fillRef>
+          <a:effectRef idx="2">
+            <a:schemeClr val="accent1"/>
+          </a:effectRef>
+          <a:fontRef idx="minor">
+            <a:schemeClr val="lt1"/>
+          </a:fontRef>
+        </p:style>
+        <p:txBody>
+          <a:bodyPr rtlCol="0" anchor="ctr"/>
+          <a:lstStyle/>
+          <a:p>
+            <a:r>
+              <a:rPr lang="en-US" sz="1600" dirty="0" smtClean="0">
+                <a:solidFill>
+                  <a:srgbClr val="000000"/>
+                </a:solidFill>
+              </a:rPr>
+              <a:t>Zip Code </a:t>
+            </a:r>
+            <a:endParaRPr lang="en-US" sz="1600" dirty="0">
+              <a:solidFill>
+                <a:srgbClr val="000000"/>
+              </a:solidFill>
+            </a:endParaRPr>
+          </a:p>
+        </p:txBody>
+      </p:sp>
+      <p:pic>
+        <p:nvPicPr>
+          <p:cNvPr id="16" name="Picture 15" descr="Screen Shot 2016-10-17 at 6.20.27 PM.png"/>
+          <p:cNvPicPr>
+            <a:picLocks noChangeAspect="1"/>
+          </p:cNvPicPr>
+          <p:nvPr/>
+        </p:nvPicPr>
+        <p:blipFill>
+          <a:blip r:embed="rId2">
+            <a:extLst>
+              <a:ext uri="{28A0092B-C50C-407E-A947-70E740481C1C}">
+                <a14:useLocalDpi xmlns:a14="http://schemas.microsoft.com/office/drawing/2010/main" val="0"/>
+              </a:ext>
+            </a:extLst>
+          </a:blip>
+          <a:stretch>
+            <a:fillRect/>
+          </a:stretch>
+        </p:blipFill>
+        <p:spPr>
+          <a:xfrm>
+            <a:off x="0" y="-470441"/>
+            <a:ext cx="6905034" cy="1666875"/>
+          </a:xfrm>
+          <a:prstGeom prst="rect">
+            <a:avLst/>
+          </a:prstGeom>
+        </p:spPr>
+      </p:pic>
+    </p:spTree>
+    <p:extLst>
+      <p:ext uri="{BB962C8B-B14F-4D97-AF65-F5344CB8AC3E}">
+        <p14:creationId xmlns:p14="http://schemas.microsoft.com/office/powerpoint/2010/main" val="3285519935"/>
+      </p:ext>
+    </p:extLst>
+  </p:cSld>
+  <p:clrMapOvr>
+    <a:masterClrMapping/>
+  </p:clrMapOvr>
 </p:sld>
 </file>
 

</xml_diff>